<commit_message>
wrongly models in wrong branch
</commit_message>
<xml_diff>
--- a/06_PresentationUpdates/mmWave_Radar_Presentation.pptx
+++ b/06_PresentationUpdates/mmWave_Radar_Presentation.pptx
@@ -5,16 +5,17 @@
     <p:sldMasterId id="2147483648" r:id="rId1"/>
   </p:sldMasterIdLst>
   <p:notesMasterIdLst>
-    <p:notesMasterId r:id="rId9"/>
+    <p:notesMasterId r:id="rId10"/>
   </p:notesMasterIdLst>
   <p:sldIdLst>
     <p:sldId id="380" r:id="rId2"/>
     <p:sldId id="356" r:id="rId3"/>
     <p:sldId id="381" r:id="rId4"/>
     <p:sldId id="382" r:id="rId5"/>
-    <p:sldId id="383" r:id="rId6"/>
-    <p:sldId id="384" r:id="rId7"/>
-    <p:sldId id="385" r:id="rId8"/>
+    <p:sldId id="386" r:id="rId6"/>
+    <p:sldId id="383" r:id="rId7"/>
+    <p:sldId id="384" r:id="rId8"/>
+    <p:sldId id="385" r:id="rId9"/>
   </p:sldIdLst>
   <p:sldSz cx="9144000" cy="6858000" type="screen4x3"/>
   <p:notesSz cx="6858000" cy="9144000"/>
@@ -145,7 +146,7 @@
 <file path=ppt/revisionInfo.xml><?xml version="1.0" encoding="utf-8"?>
 <p1510:revInfo xmlns:a="http://schemas.openxmlformats.org/drawingml/2006/main" xmlns:r="http://schemas.openxmlformats.org/officeDocument/2006/relationships" xmlns:p1510="http://schemas.microsoft.com/office/powerpoint/2015/10/main">
   <p1510:revLst>
-    <p1510:client id="{43B3EDA9-0EEE-4EA4-841F-0926849D4277}" v="6" dt="2025-04-14T14:31:24.612"/>
+    <p1510:client id="{3092E590-2950-4AEC-9D42-F023B2ED0D8C}" v="2" dt="2025-04-19T13:46:17.973"/>
   </p1510:revLst>
 </p1510:revInfo>
 </file>
@@ -179,14 +180,6 @@
           <pc:docMk/>
           <pc:sldMk cId="1870351701" sldId="281"/>
         </pc:sldMkLst>
-        <pc:spChg chg="mod">
-          <ac:chgData name="Luis Fernando Rodriguez Gutierrez" userId="47d13518-703e-4604-b449-ba54b8feb907" providerId="ADAL" clId="{43B3EDA9-0EEE-4EA4-841F-0926849D4277}" dt="2025-04-14T14:29:54.487" v="74" actId="27636"/>
-          <ac:spMkLst>
-            <pc:docMk/>
-            <pc:sldMk cId="1870351701" sldId="281"/>
-            <ac:spMk id="3" creationId="{2C3D4EFB-0AF0-2974-148D-0A35D84F97B0}"/>
-          </ac:spMkLst>
-        </pc:spChg>
       </pc:sldChg>
       <pc:sldChg chg="del">
         <pc:chgData name="Luis Fernando Rodriguez Gutierrez" userId="47d13518-703e-4604-b449-ba54b8feb907" providerId="ADAL" clId="{43B3EDA9-0EEE-4EA4-841F-0926849D4277}" dt="2025-04-14T14:30:10.306" v="76" actId="47"/>
@@ -522,22 +515,6 @@
             <pc:docMk/>
             <pc:sldMk cId="1742724825" sldId="356"/>
             <ac:spMk id="5" creationId="{91B83917-42CB-6C06-A4F1-CD68DB8BD4AB}"/>
-          </ac:spMkLst>
-        </pc:spChg>
-        <pc:spChg chg="del">
-          <ac:chgData name="Luis Fernando Rodriguez Gutierrez" userId="47d13518-703e-4604-b449-ba54b8feb907" providerId="ADAL" clId="{43B3EDA9-0EEE-4EA4-841F-0926849D4277}" dt="2025-04-14T14:29:37.579" v="69" actId="478"/>
-          <ac:spMkLst>
-            <pc:docMk/>
-            <pc:sldMk cId="1742724825" sldId="356"/>
-            <ac:spMk id="6" creationId="{D7095A51-80BA-5083-74BF-2BA4ABD8822E}"/>
-          </ac:spMkLst>
-        </pc:spChg>
-        <pc:spChg chg="del">
-          <ac:chgData name="Luis Fernando Rodriguez Gutierrez" userId="47d13518-703e-4604-b449-ba54b8feb907" providerId="ADAL" clId="{43B3EDA9-0EEE-4EA4-841F-0926849D4277}" dt="2025-04-14T14:29:44.718" v="71" actId="478"/>
-          <ac:spMkLst>
-            <pc:docMk/>
-            <pc:sldMk cId="1742724825" sldId="356"/>
-            <ac:spMk id="20" creationId="{F6195B5F-000C-E2BC-8EDD-8564E71ACF1D}"/>
           </ac:spMkLst>
         </pc:spChg>
       </pc:sldChg>
@@ -813,29 +790,83 @@
           <pc:docMk/>
           <pc:sldMk cId="1109665091" sldId="334"/>
         </pc:sldMkLst>
-        <pc:picChg chg="mod">
-          <ac:chgData name="Luis Fernando Rodriguez Gutierrez" userId="47d13518-703e-4604-b449-ba54b8feb907" providerId="ADAL" clId="{A7C40887-B3D0-4F01-9AC0-3CAD6B0808AA}" dt="2025-03-14T18:07:34.709" v="2" actId="1035"/>
+      </pc:sldChg>
+      <pc:sldChg chg="modSp mod">
+        <pc:chgData name="Luis Fernando Rodriguez Gutierrez" userId="47d13518-703e-4604-b449-ba54b8feb907" providerId="ADAL" clId="{A7C40887-B3D0-4F01-9AC0-3CAD6B0808AA}" dt="2025-03-14T17:51:35.953" v="0" actId="20577"/>
+        <pc:sldMkLst>
+          <pc:docMk/>
+          <pc:sldMk cId="1337052178" sldId="335"/>
+        </pc:sldMkLst>
+      </pc:sldChg>
+    </pc:docChg>
+  </pc:docChgLst>
+  <pc:docChgLst>
+    <pc:chgData name="Luis Fernando Rodriguez Gutierrez" userId="47d13518-703e-4604-b449-ba54b8feb907" providerId="ADAL" clId="{3092E590-2950-4AEC-9D42-F023B2ED0D8C}"/>
+    <pc:docChg chg="undo custSel addSld delSld modSld">
+      <pc:chgData name="Luis Fernando Rodriguez Gutierrez" userId="47d13518-703e-4604-b449-ba54b8feb907" providerId="ADAL" clId="{3092E590-2950-4AEC-9D42-F023B2ED0D8C}" dt="2025-04-19T13:50:38.256" v="237" actId="20577"/>
+      <pc:docMkLst>
+        <pc:docMk/>
+      </pc:docMkLst>
+      <pc:sldChg chg="addSp modSp mod">
+        <pc:chgData name="Luis Fernando Rodriguez Gutierrez" userId="47d13518-703e-4604-b449-ba54b8feb907" providerId="ADAL" clId="{3092E590-2950-4AEC-9D42-F023B2ED0D8C}" dt="2025-04-19T13:50:38.256" v="237" actId="20577"/>
+        <pc:sldMkLst>
+          <pc:docMk/>
+          <pc:sldMk cId="1371233986" sldId="382"/>
+        </pc:sldMkLst>
+        <pc:spChg chg="mod">
+          <ac:chgData name="Luis Fernando Rodriguez Gutierrez" userId="47d13518-703e-4604-b449-ba54b8feb907" providerId="ADAL" clId="{3092E590-2950-4AEC-9D42-F023B2ED0D8C}" dt="2025-04-19T13:45:52.120" v="1" actId="20577"/>
+          <ac:spMkLst>
+            <pc:docMk/>
+            <pc:sldMk cId="1371233986" sldId="382"/>
+            <ac:spMk id="2" creationId="{46CF15AF-C673-57E5-6154-4A442E9E08B8}"/>
+          </ac:spMkLst>
+        </pc:spChg>
+        <pc:spChg chg="mod">
+          <ac:chgData name="Luis Fernando Rodriguez Gutierrez" userId="47d13518-703e-4604-b449-ba54b8feb907" providerId="ADAL" clId="{3092E590-2950-4AEC-9D42-F023B2ED0D8C}" dt="2025-04-19T13:50:38.256" v="237" actId="20577"/>
+          <ac:spMkLst>
+            <pc:docMk/>
+            <pc:sldMk cId="1371233986" sldId="382"/>
+            <ac:spMk id="3" creationId="{2C14A8D3-6948-67A4-5774-80CB804B4E2D}"/>
+          </ac:spMkLst>
+        </pc:spChg>
+        <pc:spChg chg="add mod">
+          <ac:chgData name="Luis Fernando Rodriguez Gutierrez" userId="47d13518-703e-4604-b449-ba54b8feb907" providerId="ADAL" clId="{3092E590-2950-4AEC-9D42-F023B2ED0D8C}" dt="2025-04-19T13:50:35.754" v="235" actId="20577"/>
+          <ac:spMkLst>
+            <pc:docMk/>
+            <pc:sldMk cId="1371233986" sldId="382"/>
+            <ac:spMk id="6" creationId="{194329D0-0E13-9729-28BE-76D13330ECE1}"/>
+          </ac:spMkLst>
+        </pc:spChg>
+      </pc:sldChg>
+      <pc:sldChg chg="add del">
+        <pc:chgData name="Luis Fernando Rodriguez Gutierrez" userId="47d13518-703e-4604-b449-ba54b8feb907" providerId="ADAL" clId="{3092E590-2950-4AEC-9D42-F023B2ED0D8C}" dt="2025-04-19T13:46:10.691" v="11" actId="47"/>
+        <pc:sldMkLst>
+          <pc:docMk/>
+          <pc:sldMk cId="890837339" sldId="386"/>
+        </pc:sldMkLst>
+      </pc:sldChg>
+      <pc:sldChg chg="addSp delSp modSp new mod">
+        <pc:chgData name="Luis Fernando Rodriguez Gutierrez" userId="47d13518-703e-4604-b449-ba54b8feb907" providerId="ADAL" clId="{3092E590-2950-4AEC-9D42-F023B2ED0D8C}" dt="2025-04-19T13:49:45.528" v="151" actId="1076"/>
+        <pc:sldMkLst>
+          <pc:docMk/>
+          <pc:sldMk cId="2209207768" sldId="386"/>
+        </pc:sldMkLst>
+        <pc:spChg chg="del">
+          <ac:chgData name="Luis Fernando Rodriguez Gutierrez" userId="47d13518-703e-4604-b449-ba54b8feb907" providerId="ADAL" clId="{3092E590-2950-4AEC-9D42-F023B2ED0D8C}" dt="2025-04-19T13:49:40.694" v="148" actId="478"/>
+          <ac:spMkLst>
+            <pc:docMk/>
+            <pc:sldMk cId="2209207768" sldId="386"/>
+            <ac:spMk id="3" creationId="{506F8066-45ED-C6E0-D40A-7D5A1EBFB1E6}"/>
+          </ac:spMkLst>
+        </pc:spChg>
+        <pc:picChg chg="add mod">
+          <ac:chgData name="Luis Fernando Rodriguez Gutierrez" userId="47d13518-703e-4604-b449-ba54b8feb907" providerId="ADAL" clId="{3092E590-2950-4AEC-9D42-F023B2ED0D8C}" dt="2025-04-19T13:49:45.528" v="151" actId="1076"/>
           <ac:picMkLst>
             <pc:docMk/>
-            <pc:sldMk cId="1109665091" sldId="334"/>
-            <ac:picMk id="6" creationId="{E29BC916-991F-7D8D-A1D8-0D92E26D50C9}"/>
+            <pc:sldMk cId="2209207768" sldId="386"/>
+            <ac:picMk id="7" creationId="{1DAED036-5F08-6348-9516-633E84588C1B}"/>
           </ac:picMkLst>
         </pc:picChg>
-      </pc:sldChg>
-      <pc:sldChg chg="modSp mod">
-        <pc:chgData name="Luis Fernando Rodriguez Gutierrez" userId="47d13518-703e-4604-b449-ba54b8feb907" providerId="ADAL" clId="{A7C40887-B3D0-4F01-9AC0-3CAD6B0808AA}" dt="2025-03-14T17:51:35.953" v="0" actId="20577"/>
-        <pc:sldMkLst>
-          <pc:docMk/>
-          <pc:sldMk cId="1337052178" sldId="335"/>
-        </pc:sldMkLst>
-        <pc:spChg chg="mod">
-          <ac:chgData name="Luis Fernando Rodriguez Gutierrez" userId="47d13518-703e-4604-b449-ba54b8feb907" providerId="ADAL" clId="{A7C40887-B3D0-4F01-9AC0-3CAD6B0808AA}" dt="2025-03-14T17:51:35.953" v="0" actId="20577"/>
-          <ac:spMkLst>
-            <pc:docMk/>
-            <pc:sldMk cId="1337052178" sldId="335"/>
-            <ac:spMk id="5" creationId="{CBFFEE3C-D2F0-EDFF-E7F1-E35786C61314}"/>
-          </ac:spMkLst>
-        </pc:spChg>
       </pc:sldChg>
     </pc:docChg>
   </pc:docChgLst>
@@ -924,7 +955,7 @@
           <a:p>
             <a:fld id="{914561EA-877F-40EB-BD03-9F9D93CF8F08}" type="datetimeFigureOut">
               <a:rPr lang="en-US" smtClean="0"/>
-              <a:t>4/14/2025</a:t>
+              <a:t>4/19/2025</a:t>
             </a:fld>
             <a:endParaRPr lang="en-US"/>
           </a:p>
@@ -1454,7 +1485,7 @@
           <a:p>
             <a:fld id="{AFA779F1-D9BB-4E74-86A2-2DC123167359}" type="datetime1">
               <a:rPr lang="en-US" smtClean="0"/>
-              <a:t>4/14/2025</a:t>
+              <a:t>4/19/2025</a:t>
             </a:fld>
             <a:endParaRPr lang="en-US" dirty="0"/>
           </a:p>
@@ -1630,7 +1661,7 @@
           <a:p>
             <a:fld id="{BD548D2B-CE3E-4EDD-9649-B6EE9E3C2340}" type="datetime1">
               <a:rPr lang="en-US" smtClean="0"/>
-              <a:t>4/14/2025</a:t>
+              <a:t>4/19/2025</a:t>
             </a:fld>
             <a:endParaRPr lang="en-US"/>
           </a:p>
@@ -1816,7 +1847,7 @@
           <a:p>
             <a:fld id="{ACEBBA4F-0F17-4FF1-AA6C-E0193917BC1E}" type="datetime1">
               <a:rPr lang="en-US" smtClean="0"/>
-              <a:t>4/14/2025</a:t>
+              <a:t>4/19/2025</a:t>
             </a:fld>
             <a:endParaRPr lang="en-US"/>
           </a:p>
@@ -1992,7 +2023,7 @@
           <a:p>
             <a:fld id="{0EFBEC3F-4208-4590-BA97-4119A385DFD9}" type="datetime1">
               <a:rPr lang="en-US" smtClean="0"/>
-              <a:t>4/14/2025</a:t>
+              <a:t>4/19/2025</a:t>
             </a:fld>
             <a:endParaRPr lang="en-US"/>
           </a:p>
@@ -2245,7 +2276,7 @@
           <a:p>
             <a:fld id="{B2D760EB-C9A5-467F-AA36-B176C44BCBF1}" type="datetime1">
               <a:rPr lang="en-US" smtClean="0"/>
-              <a:t>4/14/2025</a:t>
+              <a:t>4/19/2025</a:t>
             </a:fld>
             <a:endParaRPr lang="en-US"/>
           </a:p>
@@ -2538,7 +2569,7 @@
           <a:p>
             <a:fld id="{1C9B5E61-6324-405D-8AF5-05323E47D966}" type="datetime1">
               <a:rPr lang="en-US" smtClean="0"/>
-              <a:t>4/14/2025</a:t>
+              <a:t>4/19/2025</a:t>
             </a:fld>
             <a:endParaRPr lang="en-US"/>
           </a:p>
@@ -2965,7 +2996,7 @@
           <a:p>
             <a:fld id="{4A37807E-A869-4435-A051-311AEF96909D}" type="datetime1">
               <a:rPr lang="en-US" smtClean="0"/>
-              <a:t>4/14/2025</a:t>
+              <a:t>4/19/2025</a:t>
             </a:fld>
             <a:endParaRPr lang="en-US"/>
           </a:p>
@@ -3090,7 +3121,7 @@
           <a:p>
             <a:fld id="{1BC8686A-CD31-4B11-9B8F-A51012174BB0}" type="datetime1">
               <a:rPr lang="en-US" smtClean="0"/>
-              <a:t>4/14/2025</a:t>
+              <a:t>4/19/2025</a:t>
             </a:fld>
             <a:endParaRPr lang="en-US"/>
           </a:p>
@@ -3193,7 +3224,7 @@
           <a:p>
             <a:fld id="{4F4B4EA3-50E0-4631-85EF-BDA8608D293F}" type="datetime1">
               <a:rPr lang="en-US" smtClean="0"/>
-              <a:t>4/14/2025</a:t>
+              <a:t>4/19/2025</a:t>
             </a:fld>
             <a:endParaRPr lang="en-US"/>
           </a:p>
@@ -3476,7 +3507,7 @@
           <a:p>
             <a:fld id="{4BA8B4E6-89B0-4D9D-AC8C-3B8ECDAACC34}" type="datetime1">
               <a:rPr lang="en-US" smtClean="0"/>
-              <a:t>4/14/2025</a:t>
+              <a:t>4/19/2025</a:t>
             </a:fld>
             <a:endParaRPr lang="en-US"/>
           </a:p>
@@ -3736,7 +3767,7 @@
           <a:p>
             <a:fld id="{0A1BBC16-5931-43C3-BDFF-9B248A400D54}" type="datetime1">
               <a:rPr lang="en-US" smtClean="0"/>
-              <a:t>4/14/2025</a:t>
+              <a:t>4/19/2025</a:t>
             </a:fld>
             <a:endParaRPr lang="en-US"/>
           </a:p>
@@ -4047,7 +4078,7 @@
           <a:p>
             <a:fld id="{A7143E5B-78DF-476F-8A09-9FD612E00067}" type="datetime1">
               <a:rPr lang="en-US" smtClean="0"/>
-              <a:t>4/14/2025</a:t>
+              <a:t>4/19/2025</a:t>
             </a:fld>
             <a:endParaRPr lang="en-US" dirty="0"/>
           </a:p>
@@ -4593,7 +4624,7 @@
           <a:p>
             <a:fld id="{1FF5D759-AFA5-4CA4-8536-68E39A72291A}" type="datetime1">
               <a:rPr lang="en-US" smtClean="0"/>
-              <a:t>4/14/2025</a:t>
+              <a:t>4/19/2025</a:t>
             </a:fld>
             <a:endParaRPr lang="en-US" dirty="0"/>
           </a:p>
@@ -4709,7 +4740,7 @@
           <a:p>
             <a:fld id="{1AA46178-B97E-4817-9029-290586FA77E9}" type="datetime1">
               <a:rPr lang="en-US" smtClean="0"/>
-              <a:t>4/14/2025</a:t>
+              <a:t>4/19/2025</a:t>
             </a:fld>
             <a:endParaRPr lang="en-US"/>
           </a:p>
@@ -4866,7 +4897,7 @@
           <a:p>
             <a:fld id="{0EFBEC3F-4208-4590-BA97-4119A385DFD9}" type="datetime1">
               <a:rPr lang="en-US" smtClean="0"/>
-              <a:t>4/14/2025</a:t>
+              <a:t>4/19/2025</a:t>
             </a:fld>
             <a:endParaRPr lang="en-US"/>
           </a:p>
@@ -4962,7 +4993,7 @@
           <a:p>
             <a:r>
               <a:rPr lang="en-US" dirty="0"/>
-              <a:t>Period Highlight - #</a:t>
+              <a:t>Period Highlight - 5</a:t>
             </a:r>
           </a:p>
         </p:txBody>
@@ -4983,12 +5014,64 @@
             <p:ph idx="1"/>
           </p:nvPr>
         </p:nvSpPr>
-        <p:spPr/>
-        <p:txBody>
-          <a:bodyPr/>
-          <a:lstStyle/>
-          <a:p>
-            <a:endParaRPr lang="en-US"/>
+        <p:spPr>
+          <a:xfrm>
+            <a:off x="457200" y="1600200"/>
+            <a:ext cx="4114800" cy="4525963"/>
+          </a:xfrm>
+        </p:spPr>
+        <p:txBody>
+          <a:bodyPr/>
+          <a:lstStyle/>
+          <a:p>
+            <a:r>
+              <a:rPr lang="en-US" dirty="0"/>
+              <a:t>Progress</a:t>
+            </a:r>
+          </a:p>
+          <a:p>
+            <a:pPr lvl="1"/>
+            <a:r>
+              <a:rPr lang="en-US" dirty="0"/>
+              <a:t>Script with Vx and Vy.</a:t>
+            </a:r>
+          </a:p>
+          <a:p>
+            <a:pPr lvl="1"/>
+            <a:r>
+              <a:rPr lang="en-US" dirty="0"/>
+              <a:t>Read </a:t>
+            </a:r>
+            <a:r>
+              <a:rPr lang="en-US" dirty="0" err="1"/>
+              <a:t>MTi</a:t>
+            </a:r>
+            <a:r>
+              <a:rPr lang="en-US" dirty="0"/>
+              <a:t> sensor.</a:t>
+            </a:r>
+          </a:p>
+          <a:p>
+            <a:pPr lvl="1"/>
+            <a:r>
+              <a:rPr lang="en-US" dirty="0" err="1"/>
+              <a:t>mmWave</a:t>
+            </a:r>
+            <a:r>
+              <a:rPr lang="en-US" dirty="0"/>
+              <a:t> sensor Mount.</a:t>
+            </a:r>
+          </a:p>
+          <a:p>
+            <a:pPr lvl="1"/>
+            <a:endParaRPr lang="en-US" dirty="0"/>
+          </a:p>
+          <a:p>
+            <a:pPr lvl="1"/>
+            <a:endParaRPr lang="en-US" dirty="0"/>
+          </a:p>
+          <a:p>
+            <a:endParaRPr lang="en-US" dirty="0"/>
           </a:p>
         </p:txBody>
       </p:sp>
@@ -5015,7 +5098,7 @@
           <a:p>
             <a:fld id="{0EFBEC3F-4208-4590-BA97-4119A385DFD9}" type="datetime1">
               <a:rPr lang="en-US" smtClean="0"/>
-              <a:t>4/14/2025</a:t>
+              <a:t>4/19/2025</a:t>
             </a:fld>
             <a:endParaRPr lang="en-US"/>
           </a:p>
@@ -5047,6 +5130,203 @@
               <a:t>4</a:t>
             </a:fld>
             <a:endParaRPr lang="en-US"/>
+          </a:p>
+        </p:txBody>
+      </p:sp>
+      <p:sp>
+        <p:nvSpPr>
+          <p:cNvPr id="6" name="Content Placeholder 2">
+            <a:extLst>
+              <a:ext uri="{FF2B5EF4-FFF2-40B4-BE49-F238E27FC236}">
+                <a16:creationId xmlns:a16="http://schemas.microsoft.com/office/drawing/2014/main" id="{194329D0-0E13-9729-28BE-76D13330ECE1}"/>
+              </a:ext>
+            </a:extLst>
+          </p:cNvPr>
+          <p:cNvSpPr txBox="1">
+            <a:spLocks/>
+          </p:cNvSpPr>
+          <p:nvPr/>
+        </p:nvSpPr>
+        <p:spPr>
+          <a:xfrm>
+            <a:off x="4572000" y="1600199"/>
+            <a:ext cx="4114800" cy="4525963"/>
+          </a:xfrm>
+          <a:prstGeom prst="rect">
+            <a:avLst/>
+          </a:prstGeom>
+        </p:spPr>
+        <p:txBody>
+          <a:bodyPr vert="horz" lIns="91440" tIns="45720" rIns="91440" bIns="45720" rtlCol="0">
+            <a:normAutofit/>
+          </a:bodyPr>
+          <a:lstStyle>
+            <a:lvl1pPr marL="342900" indent="-342900" algn="l" defTabSz="457200" rtl="0" eaLnBrk="1" latinLnBrk="0" hangingPunct="1">
+              <a:spcBef>
+                <a:spcPct val="20000"/>
+              </a:spcBef>
+              <a:buFont typeface="Arial"/>
+              <a:buChar char="•"/>
+              <a:defRPr sz="3200" kern="1200">
+                <a:solidFill>
+                  <a:schemeClr val="tx1"/>
+                </a:solidFill>
+                <a:latin typeface="+mn-lt"/>
+                <a:ea typeface="+mn-ea"/>
+                <a:cs typeface="+mn-cs"/>
+              </a:defRPr>
+            </a:lvl1pPr>
+            <a:lvl2pPr marL="742950" indent="-285750" algn="l" defTabSz="457200" rtl="0" eaLnBrk="1" latinLnBrk="0" hangingPunct="1">
+              <a:spcBef>
+                <a:spcPct val="20000"/>
+              </a:spcBef>
+              <a:buFont typeface="Arial"/>
+              <a:buChar char="–"/>
+              <a:defRPr sz="2800" kern="1200">
+                <a:solidFill>
+                  <a:schemeClr val="tx1"/>
+                </a:solidFill>
+                <a:latin typeface="+mn-lt"/>
+                <a:ea typeface="+mn-ea"/>
+                <a:cs typeface="+mn-cs"/>
+              </a:defRPr>
+            </a:lvl2pPr>
+            <a:lvl3pPr marL="1143000" indent="-228600" algn="l" defTabSz="457200" rtl="0" eaLnBrk="1" latinLnBrk="0" hangingPunct="1">
+              <a:spcBef>
+                <a:spcPct val="20000"/>
+              </a:spcBef>
+              <a:buFont typeface="Arial"/>
+              <a:buChar char="•"/>
+              <a:defRPr sz="2400" kern="1200">
+                <a:solidFill>
+                  <a:schemeClr val="tx1"/>
+                </a:solidFill>
+                <a:latin typeface="+mn-lt"/>
+                <a:ea typeface="+mn-ea"/>
+                <a:cs typeface="+mn-cs"/>
+              </a:defRPr>
+            </a:lvl3pPr>
+            <a:lvl4pPr marL="1600200" indent="-228600" algn="l" defTabSz="457200" rtl="0" eaLnBrk="1" latinLnBrk="0" hangingPunct="1">
+              <a:spcBef>
+                <a:spcPct val="20000"/>
+              </a:spcBef>
+              <a:buFont typeface="Arial"/>
+              <a:buChar char="–"/>
+              <a:defRPr sz="2000" kern="1200">
+                <a:solidFill>
+                  <a:schemeClr val="tx1"/>
+                </a:solidFill>
+                <a:latin typeface="+mn-lt"/>
+                <a:ea typeface="+mn-ea"/>
+                <a:cs typeface="+mn-cs"/>
+              </a:defRPr>
+            </a:lvl4pPr>
+            <a:lvl5pPr marL="2057400" indent="-228600" algn="l" defTabSz="457200" rtl="0" eaLnBrk="1" latinLnBrk="0" hangingPunct="1">
+              <a:spcBef>
+                <a:spcPct val="20000"/>
+              </a:spcBef>
+              <a:buFont typeface="Arial"/>
+              <a:buChar char="»"/>
+              <a:defRPr sz="2000" kern="1200">
+                <a:solidFill>
+                  <a:schemeClr val="tx1"/>
+                </a:solidFill>
+                <a:latin typeface="+mn-lt"/>
+                <a:ea typeface="+mn-ea"/>
+                <a:cs typeface="+mn-cs"/>
+              </a:defRPr>
+            </a:lvl5pPr>
+            <a:lvl6pPr marL="2514600" indent="-228600" algn="l" defTabSz="457200" rtl="0" eaLnBrk="1" latinLnBrk="0" hangingPunct="1">
+              <a:spcBef>
+                <a:spcPct val="20000"/>
+              </a:spcBef>
+              <a:buFont typeface="Arial"/>
+              <a:buChar char="•"/>
+              <a:defRPr sz="2000" kern="1200">
+                <a:solidFill>
+                  <a:schemeClr val="tx1"/>
+                </a:solidFill>
+                <a:latin typeface="+mn-lt"/>
+                <a:ea typeface="+mn-ea"/>
+                <a:cs typeface="+mn-cs"/>
+              </a:defRPr>
+            </a:lvl6pPr>
+            <a:lvl7pPr marL="2971800" indent="-228600" algn="l" defTabSz="457200" rtl="0" eaLnBrk="1" latinLnBrk="0" hangingPunct="1">
+              <a:spcBef>
+                <a:spcPct val="20000"/>
+              </a:spcBef>
+              <a:buFont typeface="Arial"/>
+              <a:buChar char="•"/>
+              <a:defRPr sz="2000" kern="1200">
+                <a:solidFill>
+                  <a:schemeClr val="tx1"/>
+                </a:solidFill>
+                <a:latin typeface="+mn-lt"/>
+                <a:ea typeface="+mn-ea"/>
+                <a:cs typeface="+mn-cs"/>
+              </a:defRPr>
+            </a:lvl7pPr>
+            <a:lvl8pPr marL="3429000" indent="-228600" algn="l" defTabSz="457200" rtl="0" eaLnBrk="1" latinLnBrk="0" hangingPunct="1">
+              <a:spcBef>
+                <a:spcPct val="20000"/>
+              </a:spcBef>
+              <a:buFont typeface="Arial"/>
+              <a:buChar char="•"/>
+              <a:defRPr sz="2000" kern="1200">
+                <a:solidFill>
+                  <a:schemeClr val="tx1"/>
+                </a:solidFill>
+                <a:latin typeface="+mn-lt"/>
+                <a:ea typeface="+mn-ea"/>
+                <a:cs typeface="+mn-cs"/>
+              </a:defRPr>
+            </a:lvl8pPr>
+            <a:lvl9pPr marL="3886200" indent="-228600" algn="l" defTabSz="457200" rtl="0" eaLnBrk="1" latinLnBrk="0" hangingPunct="1">
+              <a:spcBef>
+                <a:spcPct val="20000"/>
+              </a:spcBef>
+              <a:buFont typeface="Arial"/>
+              <a:buChar char="•"/>
+              <a:defRPr sz="2000" kern="1200">
+                <a:solidFill>
+                  <a:schemeClr val="tx1"/>
+                </a:solidFill>
+                <a:latin typeface="+mn-lt"/>
+                <a:ea typeface="+mn-ea"/>
+                <a:cs typeface="+mn-cs"/>
+              </a:defRPr>
+            </a:lvl9pPr>
+          </a:lstStyle>
+          <a:p>
+            <a:r>
+              <a:rPr lang="en-US" dirty="0"/>
+              <a:t>Next steps</a:t>
+            </a:r>
+          </a:p>
+          <a:p>
+            <a:pPr lvl="1"/>
+            <a:r>
+              <a:rPr lang="en-US" dirty="0"/>
+              <a:t>Test sensor fusion recording.</a:t>
+            </a:r>
+          </a:p>
+          <a:p>
+            <a:pPr lvl="1"/>
+            <a:r>
+              <a:rPr lang="en-US" dirty="0"/>
+              <a:t>Print </a:t>
+            </a:r>
+            <a:r>
+              <a:rPr lang="en-US" dirty="0" err="1"/>
+              <a:t>MTi</a:t>
+            </a:r>
+            <a:r>
+              <a:rPr lang="en-US" dirty="0"/>
+              <a:t> sensor mount.</a:t>
+            </a:r>
+          </a:p>
+          <a:p>
+            <a:endParaRPr lang="en-US" dirty="0"/>
           </a:p>
         </p:txBody>
       </p:sp>
@@ -5064,6 +5344,149 @@
 </file>
 
 <file path=ppt/slides/slide5.xml><?xml version="1.0" encoding="utf-8"?>
+<p:sld xmlns:a="http://schemas.openxmlformats.org/drawingml/2006/main" xmlns:r="http://schemas.openxmlformats.org/officeDocument/2006/relationships" xmlns:p="http://schemas.openxmlformats.org/presentationml/2006/main">
+  <p:cSld>
+    <p:spTree>
+      <p:nvGrpSpPr>
+        <p:cNvPr id="1" name=""/>
+        <p:cNvGrpSpPr/>
+        <p:nvPr/>
+      </p:nvGrpSpPr>
+      <p:grpSpPr>
+        <a:xfrm>
+          <a:off x="0" y="0"/>
+          <a:ext cx="0" cy="0"/>
+          <a:chOff x="0" y="0"/>
+          <a:chExt cx="0" cy="0"/>
+        </a:xfrm>
+      </p:grpSpPr>
+      <p:sp>
+        <p:nvSpPr>
+          <p:cNvPr id="2" name="Title 1">
+            <a:extLst>
+              <a:ext uri="{FF2B5EF4-FFF2-40B4-BE49-F238E27FC236}">
+                <a16:creationId xmlns:a16="http://schemas.microsoft.com/office/drawing/2014/main" id="{CA9F5939-5CEF-D6E6-E260-5BA6D9B58146}"/>
+              </a:ext>
+            </a:extLst>
+          </p:cNvPr>
+          <p:cNvSpPr>
+            <a:spLocks noGrp="1"/>
+          </p:cNvSpPr>
+          <p:nvPr>
+            <p:ph type="title"/>
+          </p:nvPr>
+        </p:nvSpPr>
+        <p:spPr/>
+        <p:txBody>
+          <a:bodyPr/>
+          <a:lstStyle/>
+          <a:p>
+            <a:endParaRPr lang="en-US"/>
+          </a:p>
+        </p:txBody>
+      </p:sp>
+      <p:sp>
+        <p:nvSpPr>
+          <p:cNvPr id="4" name="Date Placeholder 3">
+            <a:extLst>
+              <a:ext uri="{FF2B5EF4-FFF2-40B4-BE49-F238E27FC236}">
+                <a16:creationId xmlns:a16="http://schemas.microsoft.com/office/drawing/2014/main" id="{75159E18-0E01-8944-AE24-A37E2CC409B0}"/>
+              </a:ext>
+            </a:extLst>
+          </p:cNvPr>
+          <p:cNvSpPr>
+            <a:spLocks noGrp="1"/>
+          </p:cNvSpPr>
+          <p:nvPr>
+            <p:ph type="dt" sz="half" idx="10"/>
+          </p:nvPr>
+        </p:nvSpPr>
+        <p:spPr/>
+        <p:txBody>
+          <a:bodyPr/>
+          <a:lstStyle/>
+          <a:p>
+            <a:fld id="{0EFBEC3F-4208-4590-BA97-4119A385DFD9}" type="datetime1">
+              <a:rPr lang="en-US" smtClean="0"/>
+              <a:t>4/19/2025</a:t>
+            </a:fld>
+            <a:endParaRPr lang="en-US"/>
+          </a:p>
+        </p:txBody>
+      </p:sp>
+      <p:sp>
+        <p:nvSpPr>
+          <p:cNvPr id="5" name="Slide Number Placeholder 4">
+            <a:extLst>
+              <a:ext uri="{FF2B5EF4-FFF2-40B4-BE49-F238E27FC236}">
+                <a16:creationId xmlns:a16="http://schemas.microsoft.com/office/drawing/2014/main" id="{A2026493-0322-5B61-839E-D767EA946FFB}"/>
+              </a:ext>
+            </a:extLst>
+          </p:cNvPr>
+          <p:cNvSpPr>
+            <a:spLocks noGrp="1"/>
+          </p:cNvSpPr>
+          <p:nvPr>
+            <p:ph type="sldNum" sz="quarter" idx="12"/>
+          </p:nvPr>
+        </p:nvSpPr>
+        <p:spPr/>
+        <p:txBody>
+          <a:bodyPr/>
+          <a:lstStyle/>
+          <a:p>
+            <a:fld id="{C1FF6DA9-008F-8B48-92A6-B652298478BF}" type="slidenum">
+              <a:rPr lang="en-US" smtClean="0"/>
+              <a:t>5</a:t>
+            </a:fld>
+            <a:endParaRPr lang="en-US"/>
+          </a:p>
+        </p:txBody>
+      </p:sp>
+      <p:pic>
+        <p:nvPicPr>
+          <p:cNvPr id="7" name="Picture 6">
+            <a:extLst>
+              <a:ext uri="{FF2B5EF4-FFF2-40B4-BE49-F238E27FC236}">
+                <a16:creationId xmlns:a16="http://schemas.microsoft.com/office/drawing/2014/main" id="{1DAED036-5F08-6348-9516-633E84588C1B}"/>
+              </a:ext>
+            </a:extLst>
+          </p:cNvPr>
+          <p:cNvPicPr>
+            <a:picLocks noChangeAspect="1"/>
+          </p:cNvPicPr>
+          <p:nvPr/>
+        </p:nvPicPr>
+        <p:blipFill>
+          <a:blip r:embed="rId2"/>
+          <a:stretch>
+            <a:fillRect/>
+          </a:stretch>
+        </p:blipFill>
+        <p:spPr>
+          <a:xfrm>
+            <a:off x="457200" y="1640503"/>
+            <a:ext cx="2902215" cy="2437721"/>
+          </a:xfrm>
+          <a:prstGeom prst="rect">
+            <a:avLst/>
+          </a:prstGeom>
+        </p:spPr>
+      </p:pic>
+    </p:spTree>
+    <p:extLst>
+      <p:ext uri="{BB962C8B-B14F-4D97-AF65-F5344CB8AC3E}">
+        <p14:creationId xmlns:p14="http://schemas.microsoft.com/office/powerpoint/2010/main" val="2209207768"/>
+      </p:ext>
+    </p:extLst>
+  </p:cSld>
+  <p:clrMapOvr>
+    <a:masterClrMapping/>
+  </p:clrMapOvr>
+</p:sld>
+</file>
+
+<file path=ppt/slides/slide6.xml><?xml version="1.0" encoding="utf-8"?>
 <p:sld xmlns:a="http://schemas.openxmlformats.org/drawingml/2006/main" xmlns:r="http://schemas.openxmlformats.org/officeDocument/2006/relationships" xmlns:p="http://schemas.openxmlformats.org/presentationml/2006/main">
   <p:cSld>
     <p:spTree>
@@ -5164,7 +5587,7 @@
           <a:p>
             <a:fld id="{0EFBEC3F-4208-4590-BA97-4119A385DFD9}" type="datetime1">
               <a:rPr lang="en-US" smtClean="0"/>
-              <a:t>4/14/2025</a:t>
+              <a:t>4/19/2025</a:t>
             </a:fld>
             <a:endParaRPr lang="en-US"/>
           </a:p>
@@ -5193,7 +5616,7 @@
           <a:p>
             <a:fld id="{C1FF6DA9-008F-8B48-92A6-B652298478BF}" type="slidenum">
               <a:rPr lang="en-US" smtClean="0"/>
-              <a:t>5</a:t>
+              <a:t>6</a:t>
             </a:fld>
             <a:endParaRPr lang="en-US"/>
           </a:p>
@@ -5212,7 +5635,7 @@
 </p:sld>
 </file>
 
-<file path=ppt/slides/slide6.xml><?xml version="1.0" encoding="utf-8"?>
+<file path=ppt/slides/slide7.xml><?xml version="1.0" encoding="utf-8"?>
 <p:sld xmlns:a="http://schemas.openxmlformats.org/drawingml/2006/main" xmlns:r="http://schemas.openxmlformats.org/officeDocument/2006/relationships" xmlns:p="http://schemas.openxmlformats.org/presentationml/2006/main">
   <p:cSld>
     <p:spTree>
@@ -5313,7 +5736,7 @@
           <a:p>
             <a:fld id="{0EFBEC3F-4208-4590-BA97-4119A385DFD9}" type="datetime1">
               <a:rPr lang="en-US" smtClean="0"/>
-              <a:t>4/14/2025</a:t>
+              <a:t>4/19/2025</a:t>
             </a:fld>
             <a:endParaRPr lang="en-US"/>
           </a:p>
@@ -5342,7 +5765,7 @@
           <a:p>
             <a:fld id="{C1FF6DA9-008F-8B48-92A6-B652298478BF}" type="slidenum">
               <a:rPr lang="en-US" smtClean="0"/>
-              <a:t>6</a:t>
+              <a:t>7</a:t>
             </a:fld>
             <a:endParaRPr lang="en-US"/>
           </a:p>
@@ -5361,7 +5784,7 @@
 </p:sld>
 </file>
 
-<file path=ppt/slides/slide7.xml><?xml version="1.0" encoding="utf-8"?>
+<file path=ppt/slides/slide8.xml><?xml version="1.0" encoding="utf-8"?>
 <p:sld xmlns:a="http://schemas.openxmlformats.org/drawingml/2006/main" xmlns:r="http://schemas.openxmlformats.org/officeDocument/2006/relationships" xmlns:p="http://schemas.openxmlformats.org/presentationml/2006/main">
   <p:cSld>
     <p:spTree>
@@ -5462,7 +5885,7 @@
           <a:p>
             <a:fld id="{0EFBEC3F-4208-4590-BA97-4119A385DFD9}" type="datetime1">
               <a:rPr lang="en-US" smtClean="0"/>
-              <a:t>4/14/2025</a:t>
+              <a:t>4/19/2025</a:t>
             </a:fld>
             <a:endParaRPr lang="en-US"/>
           </a:p>
@@ -5491,7 +5914,7 @@
           <a:p>
             <a:fld id="{C1FF6DA9-008F-8B48-92A6-B652298478BF}" type="slidenum">
               <a:rPr lang="en-US" smtClean="0"/>
-              <a:t>7</a:t>
+              <a:t>8</a:t>
             </a:fld>
             <a:endParaRPr lang="en-US"/>
           </a:p>

</xml_diff>

<commit_message>
Models fix, some progress was lost
</commit_message>
<xml_diff>
--- a/06_PresentationUpdates/mmWave_Radar_Presentation.pptx
+++ b/06_PresentationUpdates/mmWave_Radar_Presentation.pptx
@@ -803,7 +803,7 @@
   <pc:docChgLst>
     <pc:chgData name="Luis Fernando Rodriguez Gutierrez" userId="47d13518-703e-4604-b449-ba54b8feb907" providerId="ADAL" clId="{3092E590-2950-4AEC-9D42-F023B2ED0D8C}"/>
     <pc:docChg chg="undo custSel addSld delSld modSld">
-      <pc:chgData name="Luis Fernando Rodriguez Gutierrez" userId="47d13518-703e-4604-b449-ba54b8feb907" providerId="ADAL" clId="{3092E590-2950-4AEC-9D42-F023B2ED0D8C}" dt="2025-04-19T13:50:38.256" v="237" actId="20577"/>
+      <pc:chgData name="Luis Fernando Rodriguez Gutierrez" userId="47d13518-703e-4604-b449-ba54b8feb907" providerId="ADAL" clId="{3092E590-2950-4AEC-9D42-F023B2ED0D8C}" dt="2025-04-19T14:02:21.613" v="247" actId="14100"/>
       <pc:docMkLst>
         <pc:docMk/>
       </pc:docMkLst>
@@ -846,11 +846,19 @@
         </pc:sldMkLst>
       </pc:sldChg>
       <pc:sldChg chg="addSp delSp modSp new mod">
-        <pc:chgData name="Luis Fernando Rodriguez Gutierrez" userId="47d13518-703e-4604-b449-ba54b8feb907" providerId="ADAL" clId="{3092E590-2950-4AEC-9D42-F023B2ED0D8C}" dt="2025-04-19T13:49:45.528" v="151" actId="1076"/>
+        <pc:chgData name="Luis Fernando Rodriguez Gutierrez" userId="47d13518-703e-4604-b449-ba54b8feb907" providerId="ADAL" clId="{3092E590-2950-4AEC-9D42-F023B2ED0D8C}" dt="2025-04-19T14:02:21.613" v="247" actId="14100"/>
         <pc:sldMkLst>
           <pc:docMk/>
           <pc:sldMk cId="2209207768" sldId="386"/>
         </pc:sldMkLst>
+        <pc:spChg chg="mod">
+          <ac:chgData name="Luis Fernando Rodriguez Gutierrez" userId="47d13518-703e-4604-b449-ba54b8feb907" providerId="ADAL" clId="{3092E590-2950-4AEC-9D42-F023B2ED0D8C}" dt="2025-04-19T13:52:38.041" v="238"/>
+          <ac:spMkLst>
+            <pc:docMk/>
+            <pc:sldMk cId="2209207768" sldId="386"/>
+            <ac:spMk id="2" creationId="{CA9F5939-5CEF-D6E6-E260-5BA6D9B58146}"/>
+          </ac:spMkLst>
+        </pc:spChg>
         <pc:spChg chg="del">
           <ac:chgData name="Luis Fernando Rodriguez Gutierrez" userId="47d13518-703e-4604-b449-ba54b8feb907" providerId="ADAL" clId="{3092E590-2950-4AEC-9D42-F023B2ED0D8C}" dt="2025-04-19T13:49:40.694" v="148" actId="478"/>
           <ac:spMkLst>
@@ -865,6 +873,22 @@
             <pc:docMk/>
             <pc:sldMk cId="2209207768" sldId="386"/>
             <ac:picMk id="7" creationId="{1DAED036-5F08-6348-9516-633E84588C1B}"/>
+          </ac:picMkLst>
+        </pc:picChg>
+        <pc:picChg chg="add mod">
+          <ac:chgData name="Luis Fernando Rodriguez Gutierrez" userId="47d13518-703e-4604-b449-ba54b8feb907" providerId="ADAL" clId="{3092E590-2950-4AEC-9D42-F023B2ED0D8C}" dt="2025-04-19T14:01:40.443" v="243" actId="1076"/>
+          <ac:picMkLst>
+            <pc:docMk/>
+            <pc:sldMk cId="2209207768" sldId="386"/>
+            <ac:picMk id="9" creationId="{FE70F34C-7F25-8FAE-1FEE-055A19919BE0}"/>
+          </ac:picMkLst>
+        </pc:picChg>
+        <pc:picChg chg="add mod">
+          <ac:chgData name="Luis Fernando Rodriguez Gutierrez" userId="47d13518-703e-4604-b449-ba54b8feb907" providerId="ADAL" clId="{3092E590-2950-4AEC-9D42-F023B2ED0D8C}" dt="2025-04-19T14:02:21.613" v="247" actId="14100"/>
+          <ac:picMkLst>
+            <pc:docMk/>
+            <pc:sldMk cId="2209207768" sldId="386"/>
+            <ac:picMk id="11" creationId="{F579686C-0046-8AF4-919D-D11DFFFBB5BA}"/>
           </ac:picMkLst>
         </pc:picChg>
       </pc:sldChg>
@@ -5381,7 +5405,10 @@
           <a:bodyPr/>
           <a:lstStyle/>
           <a:p>
-            <a:endParaRPr lang="en-US"/>
+            <a:r>
+              <a:rPr lang="en-US" dirty="0"/>
+              <a:t>Period Highlight - 5</a:t>
+            </a:r>
           </a:p>
         </p:txBody>
       </p:sp>
@@ -5467,6 +5494,66 @@
           <a:xfrm>
             <a:off x="457200" y="1640503"/>
             <a:ext cx="2902215" cy="2437721"/>
+          </a:xfrm>
+          <a:prstGeom prst="rect">
+            <a:avLst/>
+          </a:prstGeom>
+        </p:spPr>
+      </p:pic>
+      <p:pic>
+        <p:nvPicPr>
+          <p:cNvPr id="9" name="Picture 8">
+            <a:extLst>
+              <a:ext uri="{FF2B5EF4-FFF2-40B4-BE49-F238E27FC236}">
+                <a16:creationId xmlns:a16="http://schemas.microsoft.com/office/drawing/2014/main" id="{FE70F34C-7F25-8FAE-1FEE-055A19919BE0}"/>
+              </a:ext>
+            </a:extLst>
+          </p:cNvPr>
+          <p:cNvPicPr>
+            <a:picLocks noChangeAspect="1"/>
+          </p:cNvPicPr>
+          <p:nvPr/>
+        </p:nvPicPr>
+        <p:blipFill>
+          <a:blip r:embed="rId3"/>
+          <a:stretch>
+            <a:fillRect/>
+          </a:stretch>
+        </p:blipFill>
+        <p:spPr>
+          <a:xfrm>
+            <a:off x="5784587" y="1640503"/>
+            <a:ext cx="2816113" cy="2437721"/>
+          </a:xfrm>
+          <a:prstGeom prst="rect">
+            <a:avLst/>
+          </a:prstGeom>
+        </p:spPr>
+      </p:pic>
+      <p:pic>
+        <p:nvPicPr>
+          <p:cNvPr id="11" name="Picture 10">
+            <a:extLst>
+              <a:ext uri="{FF2B5EF4-FFF2-40B4-BE49-F238E27FC236}">
+                <a16:creationId xmlns:a16="http://schemas.microsoft.com/office/drawing/2014/main" id="{F579686C-0046-8AF4-919D-D11DFFFBB5BA}"/>
+              </a:ext>
+            </a:extLst>
+          </p:cNvPr>
+          <p:cNvPicPr>
+            <a:picLocks noChangeAspect="1"/>
+          </p:cNvPicPr>
+          <p:nvPr/>
+        </p:nvPicPr>
+        <p:blipFill>
+          <a:blip r:embed="rId4"/>
+          <a:stretch>
+            <a:fillRect/>
+          </a:stretch>
+        </p:blipFill>
+        <p:spPr>
+          <a:xfrm>
+            <a:off x="3359414" y="1640503"/>
+            <a:ext cx="2514864" cy="2437721"/>
           </a:xfrm>
           <a:prstGeom prst="rect">
             <a:avLst/>

</xml_diff>

<commit_message>
Update for the main branch, code update and pptx made
</commit_message>
<xml_diff>
--- a/06_PresentationUpdates/mmWave_Radar_Presentation.pptx
+++ b/06_PresentationUpdates/mmWave_Radar_Presentation.pptx
@@ -5,17 +5,19 @@
     <p:sldMasterId id="2147483648" r:id="rId1"/>
   </p:sldMasterIdLst>
   <p:notesMasterIdLst>
-    <p:notesMasterId r:id="rId10"/>
+    <p:notesMasterId r:id="rId12"/>
   </p:notesMasterIdLst>
   <p:sldIdLst>
     <p:sldId id="380" r:id="rId2"/>
     <p:sldId id="356" r:id="rId3"/>
     <p:sldId id="381" r:id="rId4"/>
     <p:sldId id="382" r:id="rId5"/>
-    <p:sldId id="386" r:id="rId6"/>
-    <p:sldId id="383" r:id="rId7"/>
-    <p:sldId id="384" r:id="rId8"/>
-    <p:sldId id="385" r:id="rId9"/>
+    <p:sldId id="389" r:id="rId6"/>
+    <p:sldId id="388" r:id="rId7"/>
+    <p:sldId id="386" r:id="rId8"/>
+    <p:sldId id="383" r:id="rId9"/>
+    <p:sldId id="384" r:id="rId10"/>
+    <p:sldId id="385" r:id="rId11"/>
   </p:sldIdLst>
   <p:sldSz cx="9144000" cy="6858000" type="screen4x3"/>
   <p:notesSz cx="6858000" cy="9144000"/>
@@ -146,7 +148,7 @@
 <file path=ppt/revisionInfo.xml><?xml version="1.0" encoding="utf-8"?>
 <p1510:revInfo xmlns:a="http://schemas.openxmlformats.org/drawingml/2006/main" xmlns:r="http://schemas.openxmlformats.org/officeDocument/2006/relationships" xmlns:p1510="http://schemas.microsoft.com/office/powerpoint/2015/10/main">
   <p1510:revLst>
-    <p1510:client id="{3092E590-2950-4AEC-9D42-F023B2ED0D8C}" v="2" dt="2025-04-19T13:46:17.973"/>
+    <p1510:client id="{3092E590-2950-4AEC-9D42-F023B2ED0D8C}" v="11" dt="2025-04-23T12:09:32.132"/>
   </p1510:revLst>
 </p1510:revInfo>
 </file>
@@ -802,13 +804,13 @@
   </pc:docChgLst>
   <pc:docChgLst>
     <pc:chgData name="Luis Fernando Rodriguez Gutierrez" userId="47d13518-703e-4604-b449-ba54b8feb907" providerId="ADAL" clId="{3092E590-2950-4AEC-9D42-F023B2ED0D8C}"/>
-    <pc:docChg chg="undo custSel addSld delSld modSld">
-      <pc:chgData name="Luis Fernando Rodriguez Gutierrez" userId="47d13518-703e-4604-b449-ba54b8feb907" providerId="ADAL" clId="{3092E590-2950-4AEC-9D42-F023B2ED0D8C}" dt="2025-04-19T14:02:21.613" v="247" actId="14100"/>
+    <pc:docChg chg="undo custSel addSld delSld modSld sldOrd modMainMaster">
+      <pc:chgData name="Luis Fernando Rodriguez Gutierrez" userId="47d13518-703e-4604-b449-ba54b8feb907" providerId="ADAL" clId="{3092E590-2950-4AEC-9D42-F023B2ED0D8C}" dt="2025-04-23T12:12:27.019" v="547" actId="20577"/>
       <pc:docMkLst>
         <pc:docMk/>
       </pc:docMkLst>
       <pc:sldChg chg="addSp modSp mod">
-        <pc:chgData name="Luis Fernando Rodriguez Gutierrez" userId="47d13518-703e-4604-b449-ba54b8feb907" providerId="ADAL" clId="{3092E590-2950-4AEC-9D42-F023B2ED0D8C}" dt="2025-04-19T13:50:38.256" v="237" actId="20577"/>
+        <pc:chgData name="Luis Fernando Rodriguez Gutierrez" userId="47d13518-703e-4604-b449-ba54b8feb907" providerId="ADAL" clId="{3092E590-2950-4AEC-9D42-F023B2ED0D8C}" dt="2025-04-23T10:28:44.994" v="421" actId="20577"/>
         <pc:sldMkLst>
           <pc:docMk/>
           <pc:sldMk cId="1371233986" sldId="382"/>
@@ -822,7 +824,7 @@
           </ac:spMkLst>
         </pc:spChg>
         <pc:spChg chg="mod">
-          <ac:chgData name="Luis Fernando Rodriguez Gutierrez" userId="47d13518-703e-4604-b449-ba54b8feb907" providerId="ADAL" clId="{3092E590-2950-4AEC-9D42-F023B2ED0D8C}" dt="2025-04-19T13:50:38.256" v="237" actId="20577"/>
+          <ac:chgData name="Luis Fernando Rodriguez Gutierrez" userId="47d13518-703e-4604-b449-ba54b8feb907" providerId="ADAL" clId="{3092E590-2950-4AEC-9D42-F023B2ED0D8C}" dt="2025-04-23T10:27:48.058" v="335" actId="20577"/>
           <ac:spMkLst>
             <pc:docMk/>
             <pc:sldMk cId="1371233986" sldId="382"/>
@@ -830,7 +832,7 @@
           </ac:spMkLst>
         </pc:spChg>
         <pc:spChg chg="add mod">
-          <ac:chgData name="Luis Fernando Rodriguez Gutierrez" userId="47d13518-703e-4604-b449-ba54b8feb907" providerId="ADAL" clId="{3092E590-2950-4AEC-9D42-F023B2ED0D8C}" dt="2025-04-19T13:50:35.754" v="235" actId="20577"/>
+          <ac:chgData name="Luis Fernando Rodriguez Gutierrez" userId="47d13518-703e-4604-b449-ba54b8feb907" providerId="ADAL" clId="{3092E590-2950-4AEC-9D42-F023B2ED0D8C}" dt="2025-04-23T10:28:44.994" v="421" actId="20577"/>
           <ac:spMkLst>
             <pc:docMk/>
             <pc:sldMk cId="1371233986" sldId="382"/>
@@ -846,27 +848,27 @@
         </pc:sldMkLst>
       </pc:sldChg>
       <pc:sldChg chg="addSp delSp modSp new mod">
-        <pc:chgData name="Luis Fernando Rodriguez Gutierrez" userId="47d13518-703e-4604-b449-ba54b8feb907" providerId="ADAL" clId="{3092E590-2950-4AEC-9D42-F023B2ED0D8C}" dt="2025-04-19T14:02:21.613" v="247" actId="14100"/>
+        <pc:chgData name="Luis Fernando Rodriguez Gutierrez" userId="47d13518-703e-4604-b449-ba54b8feb907" providerId="ADAL" clId="{3092E590-2950-4AEC-9D42-F023B2ED0D8C}" dt="2025-04-23T12:12:27.019" v="547" actId="20577"/>
         <pc:sldMkLst>
           <pc:docMk/>
           <pc:sldMk cId="2209207768" sldId="386"/>
         </pc:sldMkLst>
         <pc:spChg chg="mod">
-          <ac:chgData name="Luis Fernando Rodriguez Gutierrez" userId="47d13518-703e-4604-b449-ba54b8feb907" providerId="ADAL" clId="{3092E590-2950-4AEC-9D42-F023B2ED0D8C}" dt="2025-04-19T13:52:38.041" v="238"/>
+          <ac:chgData name="Luis Fernando Rodriguez Gutierrez" userId="47d13518-703e-4604-b449-ba54b8feb907" providerId="ADAL" clId="{3092E590-2950-4AEC-9D42-F023B2ED0D8C}" dt="2025-04-23T12:12:27.019" v="547" actId="20577"/>
           <ac:spMkLst>
             <pc:docMk/>
             <pc:sldMk cId="2209207768" sldId="386"/>
             <ac:spMk id="2" creationId="{CA9F5939-5CEF-D6E6-E260-5BA6D9B58146}"/>
           </ac:spMkLst>
         </pc:spChg>
-        <pc:spChg chg="del">
-          <ac:chgData name="Luis Fernando Rodriguez Gutierrez" userId="47d13518-703e-4604-b449-ba54b8feb907" providerId="ADAL" clId="{3092E590-2950-4AEC-9D42-F023B2ED0D8C}" dt="2025-04-19T13:49:40.694" v="148" actId="478"/>
-          <ac:spMkLst>
+        <pc:picChg chg="add del mod">
+          <ac:chgData name="Luis Fernando Rodriguez Gutierrez" userId="47d13518-703e-4604-b449-ba54b8feb907" providerId="ADAL" clId="{3092E590-2950-4AEC-9D42-F023B2ED0D8C}" dt="2025-04-23T12:07:37.097" v="431" actId="478"/>
+          <ac:picMkLst>
             <pc:docMk/>
             <pc:sldMk cId="2209207768" sldId="386"/>
-            <ac:spMk id="3" creationId="{506F8066-45ED-C6E0-D40A-7D5A1EBFB1E6}"/>
-          </ac:spMkLst>
-        </pc:spChg>
+            <ac:picMk id="6" creationId="{32664DA4-AEFC-9735-0BBE-7FA4B9F3AC7F}"/>
+          </ac:picMkLst>
+        </pc:picChg>
         <pc:picChg chg="add mod">
           <ac:chgData name="Luis Fernando Rodriguez Gutierrez" userId="47d13518-703e-4604-b449-ba54b8feb907" providerId="ADAL" clId="{3092E590-2950-4AEC-9D42-F023B2ED0D8C}" dt="2025-04-19T13:49:45.528" v="151" actId="1076"/>
           <ac:picMkLst>
@@ -891,7 +893,147 @@
             <ac:picMk id="11" creationId="{F579686C-0046-8AF4-919D-D11DFFFBB5BA}"/>
           </ac:picMkLst>
         </pc:picChg>
-      </pc:sldChg>
+        <pc:picChg chg="add mod">
+          <ac:chgData name="Luis Fernando Rodriguez Gutierrez" userId="47d13518-703e-4604-b449-ba54b8feb907" providerId="ADAL" clId="{3092E590-2950-4AEC-9D42-F023B2ED0D8C}" dt="2025-04-19T14:25:08.655" v="313" actId="1076"/>
+          <ac:picMkLst>
+            <pc:docMk/>
+            <pc:sldMk cId="2209207768" sldId="386"/>
+            <ac:picMk id="1026" creationId="{DBA318C6-B232-C859-BDA5-1E1DACA26953}"/>
+          </ac:picMkLst>
+        </pc:picChg>
+      </pc:sldChg>
+      <pc:sldChg chg="new del">
+        <pc:chgData name="Luis Fernando Rodriguez Gutierrez" userId="47d13518-703e-4604-b449-ba54b8feb907" providerId="ADAL" clId="{3092E590-2950-4AEC-9D42-F023B2ED0D8C}" dt="2025-04-23T12:07:27.728" v="426" actId="47"/>
+        <pc:sldMkLst>
+          <pc:docMk/>
+          <pc:sldMk cId="3393414655" sldId="387"/>
+        </pc:sldMkLst>
+      </pc:sldChg>
+      <pc:sldChg chg="addSp delSp modSp add mod ord">
+        <pc:chgData name="Luis Fernando Rodriguez Gutierrez" userId="47d13518-703e-4604-b449-ba54b8feb907" providerId="ADAL" clId="{3092E590-2950-4AEC-9D42-F023B2ED0D8C}" dt="2025-04-23T12:11:46.713" v="488" actId="255"/>
+        <pc:sldMkLst>
+          <pc:docMk/>
+          <pc:sldMk cId="929138620" sldId="388"/>
+        </pc:sldMkLst>
+        <pc:spChg chg="mod">
+          <ac:chgData name="Luis Fernando Rodriguez Gutierrez" userId="47d13518-703e-4604-b449-ba54b8feb907" providerId="ADAL" clId="{3092E590-2950-4AEC-9D42-F023B2ED0D8C}" dt="2025-04-23T12:11:46.713" v="488" actId="255"/>
+          <ac:spMkLst>
+            <pc:docMk/>
+            <pc:sldMk cId="929138620" sldId="388"/>
+            <ac:spMk id="2" creationId="{43AAD9D2-7195-6341-431F-03ADC19A08A6}"/>
+          </ac:spMkLst>
+        </pc:spChg>
+        <pc:picChg chg="del">
+          <ac:chgData name="Luis Fernando Rodriguez Gutierrez" userId="47d13518-703e-4604-b449-ba54b8feb907" providerId="ADAL" clId="{3092E590-2950-4AEC-9D42-F023B2ED0D8C}" dt="2025-04-23T12:07:30.652" v="427" actId="478"/>
+          <ac:picMkLst>
+            <pc:docMk/>
+            <pc:sldMk cId="929138620" sldId="388"/>
+            <ac:picMk id="7" creationId="{590E0A48-58C9-9BB9-00B7-15B08631893E}"/>
+          </ac:picMkLst>
+        </pc:picChg>
+        <pc:picChg chg="add del">
+          <ac:chgData name="Luis Fernando Rodriguez Gutierrez" userId="47d13518-703e-4604-b449-ba54b8feb907" providerId="ADAL" clId="{3092E590-2950-4AEC-9D42-F023B2ED0D8C}" dt="2025-04-23T12:09:34.608" v="436" actId="478"/>
+          <ac:picMkLst>
+            <pc:docMk/>
+            <pc:sldMk cId="929138620" sldId="388"/>
+            <ac:picMk id="8" creationId="{C1E6AA15-F584-A928-418C-AEEA010D4518}"/>
+          </ac:picMkLst>
+        </pc:picChg>
+        <pc:picChg chg="del">
+          <ac:chgData name="Luis Fernando Rodriguez Gutierrez" userId="47d13518-703e-4604-b449-ba54b8feb907" providerId="ADAL" clId="{3092E590-2950-4AEC-9D42-F023B2ED0D8C}" dt="2025-04-23T12:07:31.971" v="429" actId="478"/>
+          <ac:picMkLst>
+            <pc:docMk/>
+            <pc:sldMk cId="929138620" sldId="388"/>
+            <ac:picMk id="9" creationId="{E33FC3C5-D281-DF3D-16E3-5CC733375AE1}"/>
+          </ac:picMkLst>
+        </pc:picChg>
+        <pc:picChg chg="del">
+          <ac:chgData name="Luis Fernando Rodriguez Gutierrez" userId="47d13518-703e-4604-b449-ba54b8feb907" providerId="ADAL" clId="{3092E590-2950-4AEC-9D42-F023B2ED0D8C}" dt="2025-04-23T12:07:31.235" v="428" actId="478"/>
+          <ac:picMkLst>
+            <pc:docMk/>
+            <pc:sldMk cId="929138620" sldId="388"/>
+            <ac:picMk id="11" creationId="{1775D357-0130-A55B-94CA-18EC6EDD8F8F}"/>
+          </ac:picMkLst>
+        </pc:picChg>
+        <pc:picChg chg="del">
+          <ac:chgData name="Luis Fernando Rodriguez Gutierrez" userId="47d13518-703e-4604-b449-ba54b8feb907" providerId="ADAL" clId="{3092E590-2950-4AEC-9D42-F023B2ED0D8C}" dt="2025-04-23T12:07:32.500" v="430" actId="478"/>
+          <ac:picMkLst>
+            <pc:docMk/>
+            <pc:sldMk cId="929138620" sldId="388"/>
+            <ac:picMk id="1026" creationId="{903DC001-194F-4C3B-7B76-9E0FB621F211}"/>
+          </ac:picMkLst>
+        </pc:picChg>
+      </pc:sldChg>
+      <pc:sldChg chg="addSp delSp modSp add mod">
+        <pc:chgData name="Luis Fernando Rodriguez Gutierrez" userId="47d13518-703e-4604-b449-ba54b8feb907" providerId="ADAL" clId="{3092E590-2950-4AEC-9D42-F023B2ED0D8C}" dt="2025-04-23T12:12:13.623" v="520" actId="1076"/>
+        <pc:sldMkLst>
+          <pc:docMk/>
+          <pc:sldMk cId="1514054633" sldId="389"/>
+        </pc:sldMkLst>
+        <pc:spChg chg="mod">
+          <ac:chgData name="Luis Fernando Rodriguez Gutierrez" userId="47d13518-703e-4604-b449-ba54b8feb907" providerId="ADAL" clId="{3092E590-2950-4AEC-9D42-F023B2ED0D8C}" dt="2025-04-23T12:12:02.917" v="516" actId="255"/>
+          <ac:spMkLst>
+            <pc:docMk/>
+            <pc:sldMk cId="1514054633" sldId="389"/>
+            <ac:spMk id="2" creationId="{35FDF0E7-D8BC-85D7-1123-C7E3D5776626}"/>
+          </ac:spMkLst>
+        </pc:spChg>
+        <pc:picChg chg="del">
+          <ac:chgData name="Luis Fernando Rodriguez Gutierrez" userId="47d13518-703e-4604-b449-ba54b8feb907" providerId="ADAL" clId="{3092E590-2950-4AEC-9D42-F023B2ED0D8C}" dt="2025-04-23T12:09:36.449" v="437" actId="478"/>
+          <ac:picMkLst>
+            <pc:docMk/>
+            <pc:sldMk cId="1514054633" sldId="389"/>
+            <ac:picMk id="6" creationId="{442276C9-5DE4-ECDA-0757-795623541FEA}"/>
+          </ac:picMkLst>
+        </pc:picChg>
+        <pc:picChg chg="add mod">
+          <ac:chgData name="Luis Fernando Rodriguez Gutierrez" userId="47d13518-703e-4604-b449-ba54b8feb907" providerId="ADAL" clId="{3092E590-2950-4AEC-9D42-F023B2ED0D8C}" dt="2025-04-23T12:12:13.623" v="520" actId="1076"/>
+          <ac:picMkLst>
+            <pc:docMk/>
+            <pc:sldMk cId="1514054633" sldId="389"/>
+            <ac:picMk id="7" creationId="{F99B2DA4-6175-81A1-AE4C-F587DC7B6DE1}"/>
+          </ac:picMkLst>
+        </pc:picChg>
+        <pc:picChg chg="mod">
+          <ac:chgData name="Luis Fernando Rodriguez Gutierrez" userId="47d13518-703e-4604-b449-ba54b8feb907" providerId="ADAL" clId="{3092E590-2950-4AEC-9D42-F023B2ED0D8C}" dt="2025-04-23T12:12:10.738" v="518" actId="1076"/>
+          <ac:picMkLst>
+            <pc:docMk/>
+            <pc:sldMk cId="1514054633" sldId="389"/>
+            <ac:picMk id="8" creationId="{2BDEC897-8485-A978-9247-0936409E7B9B}"/>
+          </ac:picMkLst>
+        </pc:picChg>
+        <pc:picChg chg="add mod">
+          <ac:chgData name="Luis Fernando Rodriguez Gutierrez" userId="47d13518-703e-4604-b449-ba54b8feb907" providerId="ADAL" clId="{3092E590-2950-4AEC-9D42-F023B2ED0D8C}" dt="2025-04-23T12:12:12.050" v="519" actId="1076"/>
+          <ac:picMkLst>
+            <pc:docMk/>
+            <pc:sldMk cId="1514054633" sldId="389"/>
+            <ac:picMk id="10" creationId="{B89C68D7-BD55-CDFC-8033-23E1ED388590}"/>
+          </ac:picMkLst>
+        </pc:picChg>
+        <pc:picChg chg="add mod">
+          <ac:chgData name="Luis Fernando Rodriguez Gutierrez" userId="47d13518-703e-4604-b449-ba54b8feb907" providerId="ADAL" clId="{3092E590-2950-4AEC-9D42-F023B2ED0D8C}" dt="2025-04-23T12:12:08.937" v="517" actId="1076"/>
+          <ac:picMkLst>
+            <pc:docMk/>
+            <pc:sldMk cId="1514054633" sldId="389"/>
+            <ac:picMk id="12" creationId="{0585829A-D580-5B91-83D2-F1E9E666DB2F}"/>
+          </ac:picMkLst>
+        </pc:picChg>
+      </pc:sldChg>
+      <pc:sldMasterChg chg="modSp mod">
+        <pc:chgData name="Luis Fernando Rodriguez Gutierrez" userId="47d13518-703e-4604-b449-ba54b8feb907" providerId="ADAL" clId="{3092E590-2950-4AEC-9D42-F023B2ED0D8C}" dt="2025-04-19T14:25:51.835" v="319" actId="20577"/>
+        <pc:sldMasterMkLst>
+          <pc:docMk/>
+          <pc:sldMasterMk cId="2209977519" sldId="2147483648"/>
+        </pc:sldMasterMkLst>
+        <pc:spChg chg="mod">
+          <ac:chgData name="Luis Fernando Rodriguez Gutierrez" userId="47d13518-703e-4604-b449-ba54b8feb907" providerId="ADAL" clId="{3092E590-2950-4AEC-9D42-F023B2ED0D8C}" dt="2025-04-19T14:25:51.835" v="319" actId="20577"/>
+          <ac:spMkLst>
+            <pc:docMk/>
+            <pc:sldMasterMk cId="2209977519" sldId="2147483648"/>
+            <ac:spMk id="9" creationId="{7CA9A25C-C535-0599-C8A4-D29B5CE4C20B}"/>
+          </ac:spMkLst>
+        </pc:spChg>
+      </pc:sldMasterChg>
     </pc:docChg>
   </pc:docChgLst>
 </pc:chgInfo>
@@ -979,7 +1121,7 @@
           <a:p>
             <a:fld id="{914561EA-877F-40EB-BD03-9F9D93CF8F08}" type="datetimeFigureOut">
               <a:rPr lang="en-US" smtClean="0"/>
-              <a:t>4/19/2025</a:t>
+              <a:t>4/23/2025</a:t>
             </a:fld>
             <a:endParaRPr lang="en-US"/>
           </a:p>
@@ -1509,7 +1651,7 @@
           <a:p>
             <a:fld id="{AFA779F1-D9BB-4E74-86A2-2DC123167359}" type="datetime1">
               <a:rPr lang="en-US" smtClean="0"/>
-              <a:t>4/19/2025</a:t>
+              <a:t>4/23/2025</a:t>
             </a:fld>
             <a:endParaRPr lang="en-US" dirty="0"/>
           </a:p>
@@ -1685,7 +1827,7 @@
           <a:p>
             <a:fld id="{BD548D2B-CE3E-4EDD-9649-B6EE9E3C2340}" type="datetime1">
               <a:rPr lang="en-US" smtClean="0"/>
-              <a:t>4/19/2025</a:t>
+              <a:t>4/23/2025</a:t>
             </a:fld>
             <a:endParaRPr lang="en-US"/>
           </a:p>
@@ -1871,7 +2013,7 @@
           <a:p>
             <a:fld id="{ACEBBA4F-0F17-4FF1-AA6C-E0193917BC1E}" type="datetime1">
               <a:rPr lang="en-US" smtClean="0"/>
-              <a:t>4/19/2025</a:t>
+              <a:t>4/23/2025</a:t>
             </a:fld>
             <a:endParaRPr lang="en-US"/>
           </a:p>
@@ -2047,7 +2189,7 @@
           <a:p>
             <a:fld id="{0EFBEC3F-4208-4590-BA97-4119A385DFD9}" type="datetime1">
               <a:rPr lang="en-US" smtClean="0"/>
-              <a:t>4/19/2025</a:t>
+              <a:t>4/23/2025</a:t>
             </a:fld>
             <a:endParaRPr lang="en-US"/>
           </a:p>
@@ -2076,7 +2218,7 @@
           <a:bodyPr/>
           <a:lstStyle/>
           <a:p>
-            <a:endParaRPr lang="en-US"/>
+            <a:endParaRPr lang="en-US" dirty="0"/>
           </a:p>
         </p:txBody>
       </p:sp>
@@ -2300,7 +2442,7 @@
           <a:p>
             <a:fld id="{B2D760EB-C9A5-467F-AA36-B176C44BCBF1}" type="datetime1">
               <a:rPr lang="en-US" smtClean="0"/>
-              <a:t>4/19/2025</a:t>
+              <a:t>4/23/2025</a:t>
             </a:fld>
             <a:endParaRPr lang="en-US"/>
           </a:p>
@@ -2593,7 +2735,7 @@
           <a:p>
             <a:fld id="{1C9B5E61-6324-405D-8AF5-05323E47D966}" type="datetime1">
               <a:rPr lang="en-US" smtClean="0"/>
-              <a:t>4/19/2025</a:t>
+              <a:t>4/23/2025</a:t>
             </a:fld>
             <a:endParaRPr lang="en-US"/>
           </a:p>
@@ -3020,7 +3162,7 @@
           <a:p>
             <a:fld id="{4A37807E-A869-4435-A051-311AEF96909D}" type="datetime1">
               <a:rPr lang="en-US" smtClean="0"/>
-              <a:t>4/19/2025</a:t>
+              <a:t>4/23/2025</a:t>
             </a:fld>
             <a:endParaRPr lang="en-US"/>
           </a:p>
@@ -3145,7 +3287,7 @@
           <a:p>
             <a:fld id="{1BC8686A-CD31-4B11-9B8F-A51012174BB0}" type="datetime1">
               <a:rPr lang="en-US" smtClean="0"/>
-              <a:t>4/19/2025</a:t>
+              <a:t>4/23/2025</a:t>
             </a:fld>
             <a:endParaRPr lang="en-US"/>
           </a:p>
@@ -3248,7 +3390,7 @@
           <a:p>
             <a:fld id="{4F4B4EA3-50E0-4631-85EF-BDA8608D293F}" type="datetime1">
               <a:rPr lang="en-US" smtClean="0"/>
-              <a:t>4/19/2025</a:t>
+              <a:t>4/23/2025</a:t>
             </a:fld>
             <a:endParaRPr lang="en-US"/>
           </a:p>
@@ -3531,7 +3673,7 @@
           <a:p>
             <a:fld id="{4BA8B4E6-89B0-4D9D-AC8C-3B8ECDAACC34}" type="datetime1">
               <a:rPr lang="en-US" smtClean="0"/>
-              <a:t>4/19/2025</a:t>
+              <a:t>4/23/2025</a:t>
             </a:fld>
             <a:endParaRPr lang="en-US"/>
           </a:p>
@@ -3791,7 +3933,7 @@
           <a:p>
             <a:fld id="{0A1BBC16-5931-43C3-BDFF-9B248A400D54}" type="datetime1">
               <a:rPr lang="en-US" smtClean="0"/>
-              <a:t>4/19/2025</a:t>
+              <a:t>4/23/2025</a:t>
             </a:fld>
             <a:endParaRPr lang="en-US"/>
           </a:p>
@@ -4102,7 +4244,7 @@
           <a:p>
             <a:fld id="{A7143E5B-78DF-476F-8A09-9FD612E00067}" type="datetime1">
               <a:rPr lang="en-US" smtClean="0"/>
-              <a:t>4/19/2025</a:t>
+              <a:t>4/23/2025</a:t>
             </a:fld>
             <a:endParaRPr lang="en-US" dirty="0"/>
           </a:p>
@@ -4163,7 +4305,7 @@
         <p:spPr>
           <a:xfrm>
             <a:off x="3657601" y="6352529"/>
-            <a:ext cx="2053087" cy="461665"/>
+            <a:ext cx="2053087" cy="338554"/>
           </a:xfrm>
           <a:prstGeom prst="rect">
             <a:avLst/>
@@ -4183,17 +4325,6 @@
                   <a:schemeClr val="bg1"/>
                 </a:solidFill>
               </a:rPr>
-              <a:t>Leander Hackmann</a:t>
-            </a:r>
-          </a:p>
-          <a:p>
-            <a:pPr algn="ctr"/>
-            <a:r>
-              <a:rPr lang="en-US" sz="800" dirty="0">
-                <a:solidFill>
-                  <a:schemeClr val="bg1"/>
-                </a:solidFill>
-              </a:rPr>
               <a:t>Luis Fernando Rodriguez Gutierrez</a:t>
             </a:r>
           </a:p>
@@ -4208,12 +4339,12 @@
               <a:t>FH Dortmund, </a:t>
             </a:r>
             <a:r>
-              <a:rPr lang="en-US" sz="800" dirty="0" err="1">
+              <a:rPr lang="en-US" sz="800">
                 <a:solidFill>
                   <a:schemeClr val="bg1"/>
                 </a:solidFill>
               </a:rPr>
-              <a:t>WiSe</a:t>
+              <a:t>Se 2025</a:t>
             </a:r>
             <a:r>
               <a:rPr lang="en-US" sz="800" dirty="0">
@@ -4221,7 +4352,7 @@
                   <a:schemeClr val="bg1"/>
                 </a:solidFill>
               </a:rPr>
-              <a:t> 2024/25, Master ESE</a:t>
+              <a:t>, Master ESE</a:t>
             </a:r>
           </a:p>
         </p:txBody>
@@ -4648,7 +4779,7 @@
           <a:p>
             <a:fld id="{1FF5D759-AFA5-4CA4-8536-68E39A72291A}" type="datetime1">
               <a:rPr lang="en-US" smtClean="0"/>
-              <a:t>4/19/2025</a:t>
+              <a:t>4/23/2025</a:t>
             </a:fld>
             <a:endParaRPr lang="en-US" dirty="0"/>
           </a:p>
@@ -4658,6 +4789,155 @@
     <p:extLst>
       <p:ext uri="{BB962C8B-B14F-4D97-AF65-F5344CB8AC3E}">
         <p14:creationId xmlns:p14="http://schemas.microsoft.com/office/powerpoint/2010/main" val="2975782584"/>
+      </p:ext>
+    </p:extLst>
+  </p:cSld>
+  <p:clrMapOvr>
+    <a:masterClrMapping/>
+  </p:clrMapOvr>
+</p:sld>
+</file>
+
+<file path=ppt/slides/slide10.xml><?xml version="1.0" encoding="utf-8"?>
+<p:sld xmlns:a="http://schemas.openxmlformats.org/drawingml/2006/main" xmlns:r="http://schemas.openxmlformats.org/officeDocument/2006/relationships" xmlns:p="http://schemas.openxmlformats.org/presentationml/2006/main">
+  <p:cSld>
+    <p:spTree>
+      <p:nvGrpSpPr>
+        <p:cNvPr id="1" name="">
+          <a:extLst>
+            <a:ext uri="{FF2B5EF4-FFF2-40B4-BE49-F238E27FC236}">
+              <a16:creationId xmlns:a16="http://schemas.microsoft.com/office/drawing/2014/main" id="{D9E21E86-C1EF-3DA2-77C9-D6FFF6003A6E}"/>
+            </a:ext>
+          </a:extLst>
+        </p:cNvPr>
+        <p:cNvGrpSpPr/>
+        <p:nvPr/>
+      </p:nvGrpSpPr>
+      <p:grpSpPr>
+        <a:xfrm>
+          <a:off x="0" y="0"/>
+          <a:ext cx="0" cy="0"/>
+          <a:chOff x="0" y="0"/>
+          <a:chExt cx="0" cy="0"/>
+        </a:xfrm>
+      </p:grpSpPr>
+      <p:sp>
+        <p:nvSpPr>
+          <p:cNvPr id="2" name="Title 1">
+            <a:extLst>
+              <a:ext uri="{FF2B5EF4-FFF2-40B4-BE49-F238E27FC236}">
+                <a16:creationId xmlns:a16="http://schemas.microsoft.com/office/drawing/2014/main" id="{8B9CB0E3-168F-015C-2776-B3A4A494F546}"/>
+              </a:ext>
+            </a:extLst>
+          </p:cNvPr>
+          <p:cNvSpPr>
+            <a:spLocks noGrp="1"/>
+          </p:cNvSpPr>
+          <p:nvPr>
+            <p:ph type="title"/>
+          </p:nvPr>
+        </p:nvSpPr>
+        <p:spPr/>
+        <p:txBody>
+          <a:bodyPr>
+            <a:normAutofit/>
+          </a:bodyPr>
+          <a:lstStyle/>
+          <a:p>
+            <a:r>
+              <a:rPr lang="en-US" dirty="0"/>
+              <a:t>Period Highlight - #</a:t>
+            </a:r>
+          </a:p>
+        </p:txBody>
+      </p:sp>
+      <p:sp>
+        <p:nvSpPr>
+          <p:cNvPr id="3" name="Content Placeholder 2">
+            <a:extLst>
+              <a:ext uri="{FF2B5EF4-FFF2-40B4-BE49-F238E27FC236}">
+                <a16:creationId xmlns:a16="http://schemas.microsoft.com/office/drawing/2014/main" id="{F4771035-D5C1-2F83-D3EE-6DA5A08633A3}"/>
+              </a:ext>
+            </a:extLst>
+          </p:cNvPr>
+          <p:cNvSpPr>
+            <a:spLocks noGrp="1"/>
+          </p:cNvSpPr>
+          <p:nvPr>
+            <p:ph idx="1"/>
+          </p:nvPr>
+        </p:nvSpPr>
+        <p:spPr/>
+        <p:txBody>
+          <a:bodyPr/>
+          <a:lstStyle/>
+          <a:p>
+            <a:endParaRPr lang="en-US"/>
+          </a:p>
+        </p:txBody>
+      </p:sp>
+      <p:sp>
+        <p:nvSpPr>
+          <p:cNvPr id="4" name="Date Placeholder 3">
+            <a:extLst>
+              <a:ext uri="{FF2B5EF4-FFF2-40B4-BE49-F238E27FC236}">
+                <a16:creationId xmlns:a16="http://schemas.microsoft.com/office/drawing/2014/main" id="{511CA94A-D74E-F4FB-E3C8-86963ACCA4F6}"/>
+              </a:ext>
+            </a:extLst>
+          </p:cNvPr>
+          <p:cNvSpPr>
+            <a:spLocks noGrp="1"/>
+          </p:cNvSpPr>
+          <p:nvPr>
+            <p:ph type="dt" sz="half" idx="10"/>
+          </p:nvPr>
+        </p:nvSpPr>
+        <p:spPr/>
+        <p:txBody>
+          <a:bodyPr/>
+          <a:lstStyle/>
+          <a:p>
+            <a:fld id="{0EFBEC3F-4208-4590-BA97-4119A385DFD9}" type="datetime1">
+              <a:rPr lang="en-US" smtClean="0"/>
+              <a:t>4/23/2025</a:t>
+            </a:fld>
+            <a:endParaRPr lang="en-US"/>
+          </a:p>
+        </p:txBody>
+      </p:sp>
+      <p:sp>
+        <p:nvSpPr>
+          <p:cNvPr id="5" name="Slide Number Placeholder 4">
+            <a:extLst>
+              <a:ext uri="{FF2B5EF4-FFF2-40B4-BE49-F238E27FC236}">
+                <a16:creationId xmlns:a16="http://schemas.microsoft.com/office/drawing/2014/main" id="{AD09FB45-B740-A0A6-5BA7-AC6C7249CC05}"/>
+              </a:ext>
+            </a:extLst>
+          </p:cNvPr>
+          <p:cNvSpPr>
+            <a:spLocks noGrp="1"/>
+          </p:cNvSpPr>
+          <p:nvPr>
+            <p:ph type="sldNum" sz="quarter" idx="12"/>
+          </p:nvPr>
+        </p:nvSpPr>
+        <p:spPr/>
+        <p:txBody>
+          <a:bodyPr/>
+          <a:lstStyle/>
+          <a:p>
+            <a:fld id="{C1FF6DA9-008F-8B48-92A6-B652298478BF}" type="slidenum">
+              <a:rPr lang="en-US" smtClean="0"/>
+              <a:t>10</a:t>
+            </a:fld>
+            <a:endParaRPr lang="en-US"/>
+          </a:p>
+        </p:txBody>
+      </p:sp>
+    </p:spTree>
+    <p:extLst>
+      <p:ext uri="{BB962C8B-B14F-4D97-AF65-F5344CB8AC3E}">
+        <p14:creationId xmlns:p14="http://schemas.microsoft.com/office/powerpoint/2010/main" val="3506300580"/>
       </p:ext>
     </p:extLst>
   </p:cSld>
@@ -4764,7 +5044,7 @@
           <a:p>
             <a:fld id="{1AA46178-B97E-4817-9029-290586FA77E9}" type="datetime1">
               <a:rPr lang="en-US" smtClean="0"/>
-              <a:t>4/19/2025</a:t>
+              <a:t>4/23/2025</a:t>
             </a:fld>
             <a:endParaRPr lang="en-US"/>
           </a:p>
@@ -4921,7 +5201,7 @@
           <a:p>
             <a:fld id="{0EFBEC3F-4208-4590-BA97-4119A385DFD9}" type="datetime1">
               <a:rPr lang="en-US" smtClean="0"/>
-              <a:t>4/19/2025</a:t>
+              <a:t>4/23/2025</a:t>
             </a:fld>
             <a:endParaRPr lang="en-US"/>
           </a:p>
@@ -5057,7 +5337,7 @@
             <a:pPr lvl="1"/>
             <a:r>
               <a:rPr lang="en-US" dirty="0"/>
-              <a:t>Script with Vx and Vy.</a:t>
+              <a:t>Python script with Vx and Vy.</a:t>
             </a:r>
           </a:p>
           <a:p>
@@ -5068,11 +5348,11 @@
             </a:r>
             <a:r>
               <a:rPr lang="en-US" dirty="0" err="1"/>
-              <a:t>MTi</a:t>
+              <a:t>Mti</a:t>
             </a:r>
             <a:r>
               <a:rPr lang="en-US" dirty="0"/>
-              <a:t> sensor.</a:t>
+              <a:t> (IMU) sensor.</a:t>
             </a:r>
           </a:p>
           <a:p>
@@ -5122,7 +5402,7 @@
           <a:p>
             <a:fld id="{0EFBEC3F-4208-4590-BA97-4119A385DFD9}" type="datetime1">
               <a:rPr lang="en-US" smtClean="0"/>
-              <a:t>4/19/2025</a:t>
+              <a:t>4/23/2025</a:t>
             </a:fld>
             <a:endParaRPr lang="en-US"/>
           </a:p>
@@ -5182,7 +5462,7 @@
         </p:spPr>
         <p:txBody>
           <a:bodyPr vert="horz" lIns="91440" tIns="45720" rIns="91440" bIns="45720" rtlCol="0">
-            <a:normAutofit/>
+            <a:normAutofit fontScale="92500" lnSpcReduction="10000"/>
           </a:bodyPr>
           <a:lstStyle>
             <a:lvl1pPr marL="342900" indent="-342900" algn="l" defTabSz="457200" rtl="0" eaLnBrk="1" latinLnBrk="0" hangingPunct="1">
@@ -5331,13 +5611,6 @@
             <a:pPr lvl="1"/>
             <a:r>
               <a:rPr lang="en-US" dirty="0"/>
-              <a:t>Test sensor fusion recording.</a:t>
-            </a:r>
-          </a:p>
-          <a:p>
-            <a:pPr lvl="1"/>
-            <a:r>
-              <a:rPr lang="en-US" dirty="0"/>
               <a:t>Print </a:t>
             </a:r>
             <a:r>
@@ -5347,6 +5620,27 @@
             <a:r>
               <a:rPr lang="en-US" dirty="0"/>
               <a:t> sensor mount.</a:t>
+            </a:r>
+          </a:p>
+          <a:p>
+            <a:pPr lvl="1"/>
+            <a:r>
+              <a:rPr lang="en-US" dirty="0"/>
+              <a:t>Test sensor fusion recording.</a:t>
+            </a:r>
+          </a:p>
+          <a:p>
+            <a:pPr lvl="1"/>
+            <a:r>
+              <a:rPr lang="en-US" dirty="0"/>
+              <a:t>Validate implementation of Vx and Vy .</a:t>
+            </a:r>
+          </a:p>
+          <a:p>
+            <a:pPr lvl="1"/>
+            <a:r>
+              <a:rPr lang="en-US" dirty="0"/>
+              <a:t>Implement Vx and Vy with IMU values, for rotation.</a:t>
             </a:r>
           </a:p>
           <a:p>
@@ -5372,6 +5666,418 @@
   <p:cSld>
     <p:spTree>
       <p:nvGrpSpPr>
+        <p:cNvPr id="1" name="">
+          <a:extLst>
+            <a:ext uri="{FF2B5EF4-FFF2-40B4-BE49-F238E27FC236}">
+              <a16:creationId xmlns:a16="http://schemas.microsoft.com/office/drawing/2014/main" id="{4B47BC48-EF02-C454-0A10-77A12319FA89}"/>
+            </a:ext>
+          </a:extLst>
+        </p:cNvPr>
+        <p:cNvGrpSpPr/>
+        <p:nvPr/>
+      </p:nvGrpSpPr>
+      <p:grpSpPr>
+        <a:xfrm>
+          <a:off x="0" y="0"/>
+          <a:ext cx="0" cy="0"/>
+          <a:chOff x="0" y="0"/>
+          <a:chExt cx="0" cy="0"/>
+        </a:xfrm>
+      </p:grpSpPr>
+      <p:sp>
+        <p:nvSpPr>
+          <p:cNvPr id="2" name="Title 1">
+            <a:extLst>
+              <a:ext uri="{FF2B5EF4-FFF2-40B4-BE49-F238E27FC236}">
+                <a16:creationId xmlns:a16="http://schemas.microsoft.com/office/drawing/2014/main" id="{35FDF0E7-D8BC-85D7-1123-C7E3D5776626}"/>
+              </a:ext>
+            </a:extLst>
+          </p:cNvPr>
+          <p:cNvSpPr>
+            <a:spLocks noGrp="1"/>
+          </p:cNvSpPr>
+          <p:nvPr>
+            <p:ph type="title"/>
+          </p:nvPr>
+        </p:nvSpPr>
+        <p:spPr/>
+        <p:txBody>
+          <a:bodyPr>
+            <a:normAutofit fontScale="90000"/>
+          </a:bodyPr>
+          <a:lstStyle/>
+          <a:p>
+            <a:r>
+              <a:rPr lang="en-US" dirty="0"/>
+              <a:t>Period Highlight – 5</a:t>
+            </a:r>
+            <a:br>
+              <a:rPr lang="en-US" dirty="0"/>
+            </a:br>
+            <a:r>
+              <a:rPr lang="en-US" sz="3600" dirty="0"/>
+              <a:t>Vx &amp; Vy Components</a:t>
+            </a:r>
+          </a:p>
+        </p:txBody>
+      </p:sp>
+      <p:sp>
+        <p:nvSpPr>
+          <p:cNvPr id="4" name="Date Placeholder 3">
+            <a:extLst>
+              <a:ext uri="{FF2B5EF4-FFF2-40B4-BE49-F238E27FC236}">
+                <a16:creationId xmlns:a16="http://schemas.microsoft.com/office/drawing/2014/main" id="{1E2C4D02-C509-DCF3-AD5E-9FAB166CA437}"/>
+              </a:ext>
+            </a:extLst>
+          </p:cNvPr>
+          <p:cNvSpPr>
+            <a:spLocks noGrp="1"/>
+          </p:cNvSpPr>
+          <p:nvPr>
+            <p:ph type="dt" sz="half" idx="10"/>
+          </p:nvPr>
+        </p:nvSpPr>
+        <p:spPr/>
+        <p:txBody>
+          <a:bodyPr/>
+          <a:lstStyle/>
+          <a:p>
+            <a:fld id="{0EFBEC3F-4208-4590-BA97-4119A385DFD9}" type="datetime1">
+              <a:rPr lang="en-US" smtClean="0"/>
+              <a:t>4/23/2025</a:t>
+            </a:fld>
+            <a:endParaRPr lang="en-US"/>
+          </a:p>
+        </p:txBody>
+      </p:sp>
+      <p:sp>
+        <p:nvSpPr>
+          <p:cNvPr id="5" name="Slide Number Placeholder 4">
+            <a:extLst>
+              <a:ext uri="{FF2B5EF4-FFF2-40B4-BE49-F238E27FC236}">
+                <a16:creationId xmlns:a16="http://schemas.microsoft.com/office/drawing/2014/main" id="{F01CEEAC-37AD-78A7-CD9D-B970F44AD97E}"/>
+              </a:ext>
+            </a:extLst>
+          </p:cNvPr>
+          <p:cNvSpPr>
+            <a:spLocks noGrp="1"/>
+          </p:cNvSpPr>
+          <p:nvPr>
+            <p:ph type="sldNum" sz="quarter" idx="12"/>
+          </p:nvPr>
+        </p:nvSpPr>
+        <p:spPr/>
+        <p:txBody>
+          <a:bodyPr/>
+          <a:lstStyle/>
+          <a:p>
+            <a:fld id="{C1FF6DA9-008F-8B48-92A6-B652298478BF}" type="slidenum">
+              <a:rPr lang="en-US" smtClean="0"/>
+              <a:t>5</a:t>
+            </a:fld>
+            <a:endParaRPr lang="en-US"/>
+          </a:p>
+        </p:txBody>
+      </p:sp>
+      <p:pic>
+        <p:nvPicPr>
+          <p:cNvPr id="8" name="Picture 7">
+            <a:extLst>
+              <a:ext uri="{FF2B5EF4-FFF2-40B4-BE49-F238E27FC236}">
+                <a16:creationId xmlns:a16="http://schemas.microsoft.com/office/drawing/2014/main" id="{2BDEC897-8485-A978-9247-0936409E7B9B}"/>
+              </a:ext>
+            </a:extLst>
+          </p:cNvPr>
+          <p:cNvPicPr>
+            <a:picLocks noChangeAspect="1"/>
+          </p:cNvPicPr>
+          <p:nvPr/>
+        </p:nvPicPr>
+        <p:blipFill>
+          <a:blip r:embed="rId2"/>
+          <a:stretch>
+            <a:fillRect/>
+          </a:stretch>
+        </p:blipFill>
+        <p:spPr>
+          <a:xfrm>
+            <a:off x="5007118" y="3863227"/>
+            <a:ext cx="2428942" cy="2492123"/>
+          </a:xfrm>
+          <a:prstGeom prst="rect">
+            <a:avLst/>
+          </a:prstGeom>
+        </p:spPr>
+      </p:pic>
+      <p:pic>
+        <p:nvPicPr>
+          <p:cNvPr id="7" name="Picture 6">
+            <a:extLst>
+              <a:ext uri="{FF2B5EF4-FFF2-40B4-BE49-F238E27FC236}">
+                <a16:creationId xmlns:a16="http://schemas.microsoft.com/office/drawing/2014/main" id="{F99B2DA4-6175-81A1-AE4C-F587DC7B6DE1}"/>
+              </a:ext>
+            </a:extLst>
+          </p:cNvPr>
+          <p:cNvPicPr>
+            <a:picLocks noChangeAspect="1"/>
+          </p:cNvPicPr>
+          <p:nvPr/>
+        </p:nvPicPr>
+        <p:blipFill>
+          <a:blip r:embed="rId3"/>
+          <a:stretch>
+            <a:fillRect/>
+          </a:stretch>
+        </p:blipFill>
+        <p:spPr>
+          <a:xfrm>
+            <a:off x="1003901" y="1579564"/>
+            <a:ext cx="2215116" cy="2353150"/>
+          </a:xfrm>
+          <a:prstGeom prst="rect">
+            <a:avLst/>
+          </a:prstGeom>
+        </p:spPr>
+      </p:pic>
+      <p:pic>
+        <p:nvPicPr>
+          <p:cNvPr id="10" name="Picture 9">
+            <a:extLst>
+              <a:ext uri="{FF2B5EF4-FFF2-40B4-BE49-F238E27FC236}">
+                <a16:creationId xmlns:a16="http://schemas.microsoft.com/office/drawing/2014/main" id="{B89C68D7-BD55-CDFC-8033-23E1ED388590}"/>
+              </a:ext>
+            </a:extLst>
+          </p:cNvPr>
+          <p:cNvPicPr>
+            <a:picLocks noChangeAspect="1"/>
+          </p:cNvPicPr>
+          <p:nvPr/>
+        </p:nvPicPr>
+        <p:blipFill>
+          <a:blip r:embed="rId4"/>
+          <a:stretch>
+            <a:fillRect/>
+          </a:stretch>
+        </p:blipFill>
+        <p:spPr>
+          <a:xfrm>
+            <a:off x="5111495" y="1533050"/>
+            <a:ext cx="2220187" cy="2399664"/>
+          </a:xfrm>
+          <a:prstGeom prst="rect">
+            <a:avLst/>
+          </a:prstGeom>
+        </p:spPr>
+      </p:pic>
+      <p:pic>
+        <p:nvPicPr>
+          <p:cNvPr id="12" name="Picture 11">
+            <a:extLst>
+              <a:ext uri="{FF2B5EF4-FFF2-40B4-BE49-F238E27FC236}">
+                <a16:creationId xmlns:a16="http://schemas.microsoft.com/office/drawing/2014/main" id="{0585829A-D580-5B91-83D2-F1E9E666DB2F}"/>
+              </a:ext>
+            </a:extLst>
+          </p:cNvPr>
+          <p:cNvPicPr>
+            <a:picLocks noChangeAspect="1"/>
+          </p:cNvPicPr>
+          <p:nvPr/>
+        </p:nvPicPr>
+        <p:blipFill>
+          <a:blip r:embed="rId5"/>
+          <a:stretch>
+            <a:fillRect/>
+          </a:stretch>
+        </p:blipFill>
+        <p:spPr>
+          <a:xfrm>
+            <a:off x="1108279" y="3932714"/>
+            <a:ext cx="2239179" cy="2353150"/>
+          </a:xfrm>
+          <a:prstGeom prst="rect">
+            <a:avLst/>
+          </a:prstGeom>
+        </p:spPr>
+      </p:pic>
+    </p:spTree>
+    <p:extLst>
+      <p:ext uri="{BB962C8B-B14F-4D97-AF65-F5344CB8AC3E}">
+        <p14:creationId xmlns:p14="http://schemas.microsoft.com/office/powerpoint/2010/main" val="1514054633"/>
+      </p:ext>
+    </p:extLst>
+  </p:cSld>
+  <p:clrMapOvr>
+    <a:masterClrMapping/>
+  </p:clrMapOvr>
+</p:sld>
+</file>
+
+<file path=ppt/slides/slide6.xml><?xml version="1.0" encoding="utf-8"?>
+<p:sld xmlns:a="http://schemas.openxmlformats.org/drawingml/2006/main" xmlns:r="http://schemas.openxmlformats.org/officeDocument/2006/relationships" xmlns:p="http://schemas.openxmlformats.org/presentationml/2006/main">
+  <p:cSld>
+    <p:spTree>
+      <p:nvGrpSpPr>
+        <p:cNvPr id="1" name="">
+          <a:extLst>
+            <a:ext uri="{FF2B5EF4-FFF2-40B4-BE49-F238E27FC236}">
+              <a16:creationId xmlns:a16="http://schemas.microsoft.com/office/drawing/2014/main" id="{58D50532-84BE-D925-9D3D-437F470CDB38}"/>
+            </a:ext>
+          </a:extLst>
+        </p:cNvPr>
+        <p:cNvGrpSpPr/>
+        <p:nvPr/>
+      </p:nvGrpSpPr>
+      <p:grpSpPr>
+        <a:xfrm>
+          <a:off x="0" y="0"/>
+          <a:ext cx="0" cy="0"/>
+          <a:chOff x="0" y="0"/>
+          <a:chExt cx="0" cy="0"/>
+        </a:xfrm>
+      </p:grpSpPr>
+      <p:sp>
+        <p:nvSpPr>
+          <p:cNvPr id="2" name="Title 1">
+            <a:extLst>
+              <a:ext uri="{FF2B5EF4-FFF2-40B4-BE49-F238E27FC236}">
+                <a16:creationId xmlns:a16="http://schemas.microsoft.com/office/drawing/2014/main" id="{43AAD9D2-7195-6341-431F-03ADC19A08A6}"/>
+              </a:ext>
+            </a:extLst>
+          </p:cNvPr>
+          <p:cNvSpPr>
+            <a:spLocks noGrp="1"/>
+          </p:cNvSpPr>
+          <p:nvPr>
+            <p:ph type="title"/>
+          </p:nvPr>
+        </p:nvSpPr>
+        <p:spPr/>
+        <p:txBody>
+          <a:bodyPr>
+            <a:normAutofit fontScale="90000"/>
+          </a:bodyPr>
+          <a:lstStyle/>
+          <a:p>
+            <a:r>
+              <a:rPr lang="en-US" dirty="0"/>
+              <a:t>Period Highlight – 5</a:t>
+            </a:r>
+            <a:br>
+              <a:rPr lang="en-US" dirty="0"/>
+            </a:br>
+            <a:r>
+              <a:rPr lang="en-US" sz="3100" dirty="0"/>
+              <a:t>Sensor Fusion</a:t>
+            </a:r>
+          </a:p>
+        </p:txBody>
+      </p:sp>
+      <p:sp>
+        <p:nvSpPr>
+          <p:cNvPr id="4" name="Date Placeholder 3">
+            <a:extLst>
+              <a:ext uri="{FF2B5EF4-FFF2-40B4-BE49-F238E27FC236}">
+                <a16:creationId xmlns:a16="http://schemas.microsoft.com/office/drawing/2014/main" id="{7894EDE4-393D-30A0-561C-98D8E4854EAF}"/>
+              </a:ext>
+            </a:extLst>
+          </p:cNvPr>
+          <p:cNvSpPr>
+            <a:spLocks noGrp="1"/>
+          </p:cNvSpPr>
+          <p:nvPr>
+            <p:ph type="dt" sz="half" idx="10"/>
+          </p:nvPr>
+        </p:nvSpPr>
+        <p:spPr/>
+        <p:txBody>
+          <a:bodyPr/>
+          <a:lstStyle/>
+          <a:p>
+            <a:fld id="{0EFBEC3F-4208-4590-BA97-4119A385DFD9}" type="datetime1">
+              <a:rPr lang="en-US" smtClean="0"/>
+              <a:t>4/23/2025</a:t>
+            </a:fld>
+            <a:endParaRPr lang="en-US"/>
+          </a:p>
+        </p:txBody>
+      </p:sp>
+      <p:sp>
+        <p:nvSpPr>
+          <p:cNvPr id="5" name="Slide Number Placeholder 4">
+            <a:extLst>
+              <a:ext uri="{FF2B5EF4-FFF2-40B4-BE49-F238E27FC236}">
+                <a16:creationId xmlns:a16="http://schemas.microsoft.com/office/drawing/2014/main" id="{09D88CB4-B209-E90F-D694-C25EA917E828}"/>
+              </a:ext>
+            </a:extLst>
+          </p:cNvPr>
+          <p:cNvSpPr>
+            <a:spLocks noGrp="1"/>
+          </p:cNvSpPr>
+          <p:nvPr>
+            <p:ph type="sldNum" sz="quarter" idx="12"/>
+          </p:nvPr>
+        </p:nvSpPr>
+        <p:spPr/>
+        <p:txBody>
+          <a:bodyPr/>
+          <a:lstStyle/>
+          <a:p>
+            <a:fld id="{C1FF6DA9-008F-8B48-92A6-B652298478BF}" type="slidenum">
+              <a:rPr lang="en-US" smtClean="0"/>
+              <a:t>6</a:t>
+            </a:fld>
+            <a:endParaRPr lang="en-US"/>
+          </a:p>
+        </p:txBody>
+      </p:sp>
+      <p:pic>
+        <p:nvPicPr>
+          <p:cNvPr id="6" name="Picture 5">
+            <a:extLst>
+              <a:ext uri="{FF2B5EF4-FFF2-40B4-BE49-F238E27FC236}">
+                <a16:creationId xmlns:a16="http://schemas.microsoft.com/office/drawing/2014/main" id="{87BC93AE-E1F7-304D-0B5A-2D32DE237582}"/>
+              </a:ext>
+            </a:extLst>
+          </p:cNvPr>
+          <p:cNvPicPr>
+            <a:picLocks noChangeAspect="1"/>
+          </p:cNvPicPr>
+          <p:nvPr/>
+        </p:nvPicPr>
+        <p:blipFill>
+          <a:blip r:embed="rId2"/>
+          <a:stretch>
+            <a:fillRect/>
+          </a:stretch>
+        </p:blipFill>
+        <p:spPr>
+          <a:xfrm>
+            <a:off x="2447925" y="1847850"/>
+            <a:ext cx="4248150" cy="3162300"/>
+          </a:xfrm>
+          <a:prstGeom prst="rect">
+            <a:avLst/>
+          </a:prstGeom>
+        </p:spPr>
+      </p:pic>
+    </p:spTree>
+    <p:extLst>
+      <p:ext uri="{BB962C8B-B14F-4D97-AF65-F5344CB8AC3E}">
+        <p14:creationId xmlns:p14="http://schemas.microsoft.com/office/powerpoint/2010/main" val="929138620"/>
+      </p:ext>
+    </p:extLst>
+  </p:cSld>
+  <p:clrMapOvr>
+    <a:masterClrMapping/>
+  </p:clrMapOvr>
+</p:sld>
+</file>
+
+<file path=ppt/slides/slide7.xml><?xml version="1.0" encoding="utf-8"?>
+<p:sld xmlns:a="http://schemas.openxmlformats.org/drawingml/2006/main" xmlns:r="http://schemas.openxmlformats.org/officeDocument/2006/relationships" xmlns:p="http://schemas.openxmlformats.org/presentationml/2006/main">
+  <p:cSld>
+    <p:spTree>
+      <p:nvGrpSpPr>
         <p:cNvPr id="1" name=""/>
         <p:cNvGrpSpPr/>
         <p:nvPr/>
@@ -5402,13 +6108,23 @@
         </p:nvSpPr>
         <p:spPr/>
         <p:txBody>
-          <a:bodyPr/>
+          <a:bodyPr>
+            <a:normAutofit fontScale="90000"/>
+          </a:bodyPr>
           <a:lstStyle/>
           <a:p>
             <a:r>
               <a:rPr lang="en-US" dirty="0"/>
-              <a:t>Period Highlight - 5</a:t>
-            </a:r>
+              <a:t>Period Highlight – 5</a:t>
+            </a:r>
+            <a:br>
+              <a:rPr lang="en-US" dirty="0"/>
+            </a:br>
+            <a:r>
+              <a:rPr lang="en-US" sz="3200" dirty="0"/>
+              <a:t>Hardware Implementations</a:t>
+            </a:r>
+            <a:endParaRPr lang="en-US" dirty="0"/>
           </a:p>
         </p:txBody>
       </p:sp>
@@ -5435,7 +6151,7 @@
           <a:p>
             <a:fld id="{0EFBEC3F-4208-4590-BA97-4119A385DFD9}" type="datetime1">
               <a:rPr lang="en-US" smtClean="0"/>
-              <a:t>4/19/2025</a:t>
+              <a:t>4/23/2025</a:t>
             </a:fld>
             <a:endParaRPr lang="en-US"/>
           </a:p>
@@ -5464,7 +6180,7 @@
           <a:p>
             <a:fld id="{C1FF6DA9-008F-8B48-92A6-B652298478BF}" type="slidenum">
               <a:rPr lang="en-US" smtClean="0"/>
-              <a:t>5</a:t>
+              <a:t>7</a:t>
             </a:fld>
             <a:endParaRPr lang="en-US"/>
           </a:p>
@@ -5560,6 +6276,53 @@
           </a:prstGeom>
         </p:spPr>
       </p:pic>
+      <p:pic>
+        <p:nvPicPr>
+          <p:cNvPr id="1026" name="Picture 2">
+            <a:extLst>
+              <a:ext uri="{FF2B5EF4-FFF2-40B4-BE49-F238E27FC236}">
+                <a16:creationId xmlns:a16="http://schemas.microsoft.com/office/drawing/2014/main" id="{DBA318C6-B232-C859-BDA5-1E1DACA26953}"/>
+              </a:ext>
+            </a:extLst>
+          </p:cNvPr>
+          <p:cNvPicPr>
+            <a:picLocks noChangeAspect="1" noChangeArrowheads="1"/>
+          </p:cNvPicPr>
+          <p:nvPr/>
+        </p:nvPicPr>
+        <p:blipFill>
+          <a:blip r:embed="rId5">
+            <a:extLst>
+              <a:ext uri="{28A0092B-C50C-407E-A947-70E740481C1C}">
+                <a14:useLocalDpi xmlns:a14="http://schemas.microsoft.com/office/drawing/2010/main" val="0"/>
+              </a:ext>
+            </a:extLst>
+          </a:blip>
+          <a:srcRect/>
+          <a:stretch>
+            <a:fillRect/>
+          </a:stretch>
+        </p:blipFill>
+        <p:spPr bwMode="auto">
+          <a:xfrm>
+            <a:off x="2106384" y="4078224"/>
+            <a:ext cx="4931232" cy="2278126"/>
+          </a:xfrm>
+          <a:prstGeom prst="rect">
+            <a:avLst/>
+          </a:prstGeom>
+          <a:noFill/>
+          <a:extLst>
+            <a:ext uri="{909E8E84-426E-40DD-AFC4-6F175D3DCCD1}">
+              <a14:hiddenFill xmlns:a14="http://schemas.microsoft.com/office/drawing/2010/main">
+                <a:solidFill>
+                  <a:srgbClr val="FFFFFF"/>
+                </a:solidFill>
+              </a14:hiddenFill>
+            </a:ext>
+          </a:extLst>
+        </p:spPr>
+      </p:pic>
     </p:spTree>
     <p:extLst>
       <p:ext uri="{BB962C8B-B14F-4D97-AF65-F5344CB8AC3E}">
@@ -5573,7 +6336,7 @@
 </p:sld>
 </file>
 
-<file path=ppt/slides/slide6.xml><?xml version="1.0" encoding="utf-8"?>
+<file path=ppt/slides/slide8.xml><?xml version="1.0" encoding="utf-8"?>
 <p:sld xmlns:a="http://schemas.openxmlformats.org/drawingml/2006/main" xmlns:r="http://schemas.openxmlformats.org/officeDocument/2006/relationships" xmlns:p="http://schemas.openxmlformats.org/presentationml/2006/main">
   <p:cSld>
     <p:spTree>
@@ -5674,7 +6437,7 @@
           <a:p>
             <a:fld id="{0EFBEC3F-4208-4590-BA97-4119A385DFD9}" type="datetime1">
               <a:rPr lang="en-US" smtClean="0"/>
-              <a:t>4/19/2025</a:t>
+              <a:t>4/23/2025</a:t>
             </a:fld>
             <a:endParaRPr lang="en-US"/>
           </a:p>
@@ -5703,7 +6466,7 @@
           <a:p>
             <a:fld id="{C1FF6DA9-008F-8B48-92A6-B652298478BF}" type="slidenum">
               <a:rPr lang="en-US" smtClean="0"/>
-              <a:t>6</a:t>
+              <a:t>8</a:t>
             </a:fld>
             <a:endParaRPr lang="en-US"/>
           </a:p>
@@ -5722,7 +6485,7 @@
 </p:sld>
 </file>
 
-<file path=ppt/slides/slide7.xml><?xml version="1.0" encoding="utf-8"?>
+<file path=ppt/slides/slide9.xml><?xml version="1.0" encoding="utf-8"?>
 <p:sld xmlns:a="http://schemas.openxmlformats.org/drawingml/2006/main" xmlns:r="http://schemas.openxmlformats.org/officeDocument/2006/relationships" xmlns:p="http://schemas.openxmlformats.org/presentationml/2006/main">
   <p:cSld>
     <p:spTree>
@@ -5823,7 +6586,7 @@
           <a:p>
             <a:fld id="{0EFBEC3F-4208-4590-BA97-4119A385DFD9}" type="datetime1">
               <a:rPr lang="en-US" smtClean="0"/>
-              <a:t>4/19/2025</a:t>
+              <a:t>4/23/2025</a:t>
             </a:fld>
             <a:endParaRPr lang="en-US"/>
           </a:p>
@@ -5852,7 +6615,7 @@
           <a:p>
             <a:fld id="{C1FF6DA9-008F-8B48-92A6-B652298478BF}" type="slidenum">
               <a:rPr lang="en-US" smtClean="0"/>
-              <a:t>7</a:t>
+              <a:t>9</a:t>
             </a:fld>
             <a:endParaRPr lang="en-US"/>
           </a:p>
@@ -5862,155 +6625,6 @@
     <p:extLst>
       <p:ext uri="{BB962C8B-B14F-4D97-AF65-F5344CB8AC3E}">
         <p14:creationId xmlns:p14="http://schemas.microsoft.com/office/powerpoint/2010/main" val="2017968030"/>
-      </p:ext>
-    </p:extLst>
-  </p:cSld>
-  <p:clrMapOvr>
-    <a:masterClrMapping/>
-  </p:clrMapOvr>
-</p:sld>
-</file>
-
-<file path=ppt/slides/slide8.xml><?xml version="1.0" encoding="utf-8"?>
-<p:sld xmlns:a="http://schemas.openxmlformats.org/drawingml/2006/main" xmlns:r="http://schemas.openxmlformats.org/officeDocument/2006/relationships" xmlns:p="http://schemas.openxmlformats.org/presentationml/2006/main">
-  <p:cSld>
-    <p:spTree>
-      <p:nvGrpSpPr>
-        <p:cNvPr id="1" name="">
-          <a:extLst>
-            <a:ext uri="{FF2B5EF4-FFF2-40B4-BE49-F238E27FC236}">
-              <a16:creationId xmlns:a16="http://schemas.microsoft.com/office/drawing/2014/main" id="{D9E21E86-C1EF-3DA2-77C9-D6FFF6003A6E}"/>
-            </a:ext>
-          </a:extLst>
-        </p:cNvPr>
-        <p:cNvGrpSpPr/>
-        <p:nvPr/>
-      </p:nvGrpSpPr>
-      <p:grpSpPr>
-        <a:xfrm>
-          <a:off x="0" y="0"/>
-          <a:ext cx="0" cy="0"/>
-          <a:chOff x="0" y="0"/>
-          <a:chExt cx="0" cy="0"/>
-        </a:xfrm>
-      </p:grpSpPr>
-      <p:sp>
-        <p:nvSpPr>
-          <p:cNvPr id="2" name="Title 1">
-            <a:extLst>
-              <a:ext uri="{FF2B5EF4-FFF2-40B4-BE49-F238E27FC236}">
-                <a16:creationId xmlns:a16="http://schemas.microsoft.com/office/drawing/2014/main" id="{8B9CB0E3-168F-015C-2776-B3A4A494F546}"/>
-              </a:ext>
-            </a:extLst>
-          </p:cNvPr>
-          <p:cNvSpPr>
-            <a:spLocks noGrp="1"/>
-          </p:cNvSpPr>
-          <p:nvPr>
-            <p:ph type="title"/>
-          </p:nvPr>
-        </p:nvSpPr>
-        <p:spPr/>
-        <p:txBody>
-          <a:bodyPr>
-            <a:normAutofit/>
-          </a:bodyPr>
-          <a:lstStyle/>
-          <a:p>
-            <a:r>
-              <a:rPr lang="en-US" dirty="0"/>
-              <a:t>Period Highlight - #</a:t>
-            </a:r>
-          </a:p>
-        </p:txBody>
-      </p:sp>
-      <p:sp>
-        <p:nvSpPr>
-          <p:cNvPr id="3" name="Content Placeholder 2">
-            <a:extLst>
-              <a:ext uri="{FF2B5EF4-FFF2-40B4-BE49-F238E27FC236}">
-                <a16:creationId xmlns:a16="http://schemas.microsoft.com/office/drawing/2014/main" id="{F4771035-D5C1-2F83-D3EE-6DA5A08633A3}"/>
-              </a:ext>
-            </a:extLst>
-          </p:cNvPr>
-          <p:cNvSpPr>
-            <a:spLocks noGrp="1"/>
-          </p:cNvSpPr>
-          <p:nvPr>
-            <p:ph idx="1"/>
-          </p:nvPr>
-        </p:nvSpPr>
-        <p:spPr/>
-        <p:txBody>
-          <a:bodyPr/>
-          <a:lstStyle/>
-          <a:p>
-            <a:endParaRPr lang="en-US"/>
-          </a:p>
-        </p:txBody>
-      </p:sp>
-      <p:sp>
-        <p:nvSpPr>
-          <p:cNvPr id="4" name="Date Placeholder 3">
-            <a:extLst>
-              <a:ext uri="{FF2B5EF4-FFF2-40B4-BE49-F238E27FC236}">
-                <a16:creationId xmlns:a16="http://schemas.microsoft.com/office/drawing/2014/main" id="{511CA94A-D74E-F4FB-E3C8-86963ACCA4F6}"/>
-              </a:ext>
-            </a:extLst>
-          </p:cNvPr>
-          <p:cNvSpPr>
-            <a:spLocks noGrp="1"/>
-          </p:cNvSpPr>
-          <p:nvPr>
-            <p:ph type="dt" sz="half" idx="10"/>
-          </p:nvPr>
-        </p:nvSpPr>
-        <p:spPr/>
-        <p:txBody>
-          <a:bodyPr/>
-          <a:lstStyle/>
-          <a:p>
-            <a:fld id="{0EFBEC3F-4208-4590-BA97-4119A385DFD9}" type="datetime1">
-              <a:rPr lang="en-US" smtClean="0"/>
-              <a:t>4/19/2025</a:t>
-            </a:fld>
-            <a:endParaRPr lang="en-US"/>
-          </a:p>
-        </p:txBody>
-      </p:sp>
-      <p:sp>
-        <p:nvSpPr>
-          <p:cNvPr id="5" name="Slide Number Placeholder 4">
-            <a:extLst>
-              <a:ext uri="{FF2B5EF4-FFF2-40B4-BE49-F238E27FC236}">
-                <a16:creationId xmlns:a16="http://schemas.microsoft.com/office/drawing/2014/main" id="{AD09FB45-B740-A0A6-5BA7-AC6C7249CC05}"/>
-              </a:ext>
-            </a:extLst>
-          </p:cNvPr>
-          <p:cNvSpPr>
-            <a:spLocks noGrp="1"/>
-          </p:cNvSpPr>
-          <p:nvPr>
-            <p:ph type="sldNum" sz="quarter" idx="12"/>
-          </p:nvPr>
-        </p:nvSpPr>
-        <p:spPr/>
-        <p:txBody>
-          <a:bodyPr/>
-          <a:lstStyle/>
-          <a:p>
-            <a:fld id="{C1FF6DA9-008F-8B48-92A6-B652298478BF}" type="slidenum">
-              <a:rPr lang="en-US" smtClean="0"/>
-              <a:t>8</a:t>
-            </a:fld>
-            <a:endParaRPr lang="en-US"/>
-          </a:p>
-        </p:txBody>
-      </p:sp>
-    </p:spTree>
-    <p:extLst>
-      <p:ext uri="{BB962C8B-B14F-4D97-AF65-F5344CB8AC3E}">
-        <p14:creationId xmlns:p14="http://schemas.microsoft.com/office/powerpoint/2010/main" val="3506300580"/>
       </p:ext>
     </p:extLst>
   </p:cSld>

</xml_diff>